<commit_message>
add updates for day 1 and day 2
</commit_message>
<xml_diff>
--- a/day1_session1.pptx
+++ b/day1_session1.pptx
@@ -5,7 +5,7 @@
     <p:sldMasterId id="2147484245" r:id="rId1"/>
   </p:sldMasterIdLst>
   <p:notesMasterIdLst>
-    <p:notesMasterId r:id="rId34"/>
+    <p:notesMasterId r:id="rId36"/>
   </p:notesMasterIdLst>
   <p:sldIdLst>
     <p:sldId id="256" r:id="rId2"/>
@@ -24,22 +24,24 @@
     <p:sldId id="281" r:id="rId15"/>
     <p:sldId id="282" r:id="rId16"/>
     <p:sldId id="283" r:id="rId17"/>
-    <p:sldId id="293" r:id="rId18"/>
-    <p:sldId id="294" r:id="rId19"/>
-    <p:sldId id="295" r:id="rId20"/>
-    <p:sldId id="296" r:id="rId21"/>
-    <p:sldId id="297" r:id="rId22"/>
-    <p:sldId id="298" r:id="rId23"/>
-    <p:sldId id="299" r:id="rId24"/>
-    <p:sldId id="300" r:id="rId25"/>
-    <p:sldId id="301" r:id="rId26"/>
-    <p:sldId id="302" r:id="rId27"/>
-    <p:sldId id="259" r:id="rId28"/>
-    <p:sldId id="261" r:id="rId29"/>
-    <p:sldId id="264" r:id="rId30"/>
-    <p:sldId id="265" r:id="rId31"/>
-    <p:sldId id="262" r:id="rId32"/>
-    <p:sldId id="263" r:id="rId33"/>
+    <p:sldId id="303" r:id="rId18"/>
+    <p:sldId id="293" r:id="rId19"/>
+    <p:sldId id="294" r:id="rId20"/>
+    <p:sldId id="295" r:id="rId21"/>
+    <p:sldId id="296" r:id="rId22"/>
+    <p:sldId id="297" r:id="rId23"/>
+    <p:sldId id="302" r:id="rId24"/>
+    <p:sldId id="304" r:id="rId25"/>
+    <p:sldId id="298" r:id="rId26"/>
+    <p:sldId id="299" r:id="rId27"/>
+    <p:sldId id="300" r:id="rId28"/>
+    <p:sldId id="301" r:id="rId29"/>
+    <p:sldId id="259" r:id="rId30"/>
+    <p:sldId id="261" r:id="rId31"/>
+    <p:sldId id="264" r:id="rId32"/>
+    <p:sldId id="265" r:id="rId33"/>
+    <p:sldId id="262" r:id="rId34"/>
+    <p:sldId id="263" r:id="rId35"/>
   </p:sldIdLst>
   <p:sldSz cx="12192000" cy="6858000"/>
   <p:notesSz cx="6858000" cy="9144000"/>
@@ -228,7 +230,7 @@
           <a:p>
             <a:fld id="{AFA1E916-7E7D-42EE-A466-B3DC93C494A3}" type="datetimeFigureOut">
               <a:rPr lang="en-US" smtClean="0"/>
-              <a:t>7/28/2020</a:t>
+              <a:t>7/29/2020</a:t>
             </a:fld>
             <a:endParaRPr lang="en-US"/>
           </a:p>
@@ -728,7 +730,7 @@
           <a:p>
             <a:fld id="{2F705317-0A5A-4E60-8B18-8D30CAEAC153}" type="slidenum">
               <a:rPr lang="en-US" smtClean="0"/>
-              <a:t>17</a:t>
+              <a:t>18</a:t>
             </a:fld>
             <a:endParaRPr lang="en-US"/>
           </a:p>
@@ -812,7 +814,7 @@
           <a:p>
             <a:fld id="{2F705317-0A5A-4E60-8B18-8D30CAEAC153}" type="slidenum">
               <a:rPr lang="en-US" smtClean="0"/>
-              <a:t>18</a:t>
+              <a:t>19</a:t>
             </a:fld>
             <a:endParaRPr lang="en-US"/>
           </a:p>
@@ -896,7 +898,7 @@
           <a:p>
             <a:fld id="{2F705317-0A5A-4E60-8B18-8D30CAEAC153}" type="slidenum">
               <a:rPr lang="en-US" smtClean="0"/>
-              <a:t>19</a:t>
+              <a:t>20</a:t>
             </a:fld>
             <a:endParaRPr lang="en-US"/>
           </a:p>
@@ -980,7 +982,7 @@
           <a:p>
             <a:fld id="{2F705317-0A5A-4E60-8B18-8D30CAEAC153}" type="slidenum">
               <a:rPr lang="en-US" smtClean="0"/>
-              <a:t>20</a:t>
+              <a:t>21</a:t>
             </a:fld>
             <a:endParaRPr lang="en-US"/>
           </a:p>
@@ -1064,7 +1066,7 @@
           <a:p>
             <a:fld id="{2F705317-0A5A-4E60-8B18-8D30CAEAC153}" type="slidenum">
               <a:rPr lang="en-US" smtClean="0"/>
-              <a:t>21</a:t>
+              <a:t>22</a:t>
             </a:fld>
             <a:endParaRPr lang="en-US"/>
           </a:p>
@@ -1148,7 +1150,7 @@
           <a:p>
             <a:fld id="{2F705317-0A5A-4E60-8B18-8D30CAEAC153}" type="slidenum">
               <a:rPr lang="en-US" smtClean="0"/>
-              <a:t>26</a:t>
+              <a:t>23</a:t>
             </a:fld>
             <a:endParaRPr lang="en-US"/>
           </a:p>
@@ -2065,7 +2067,7 @@
           <a:p>
             <a:fld id="{0422F25E-D946-45B2-AD50-D1BA333F68E0}" type="datetimeFigureOut">
               <a:rPr lang="en-US" smtClean="0"/>
-              <a:t>7/28/2020</a:t>
+              <a:t>7/29/2020</a:t>
             </a:fld>
             <a:endParaRPr lang="en-US"/>
           </a:p>
@@ -2278,7 +2280,7 @@
           <a:p>
             <a:fld id="{0422F25E-D946-45B2-AD50-D1BA333F68E0}" type="datetimeFigureOut">
               <a:rPr lang="en-US" smtClean="0"/>
-              <a:t>7/28/2020</a:t>
+              <a:t>7/29/2020</a:t>
             </a:fld>
             <a:endParaRPr lang="en-US"/>
           </a:p>
@@ -2534,7 +2536,7 @@
           <a:p>
             <a:fld id="{0422F25E-D946-45B2-AD50-D1BA333F68E0}" type="datetimeFigureOut">
               <a:rPr lang="en-US" smtClean="0"/>
-              <a:t>7/28/2020</a:t>
+              <a:t>7/29/2020</a:t>
             </a:fld>
             <a:endParaRPr lang="en-US"/>
           </a:p>
@@ -2721,7 +2723,7 @@
           <a:p>
             <a:fld id="{0422F25E-D946-45B2-AD50-D1BA333F68E0}" type="datetimeFigureOut">
               <a:rPr lang="en-US" smtClean="0"/>
-              <a:t>7/28/2020</a:t>
+              <a:t>7/29/2020</a:t>
             </a:fld>
             <a:endParaRPr lang="en-US"/>
           </a:p>
@@ -3064,7 +3066,7 @@
           <a:p>
             <a:fld id="{0422F25E-D946-45B2-AD50-D1BA333F68E0}" type="datetimeFigureOut">
               <a:rPr lang="en-US" smtClean="0"/>
-              <a:t>7/28/2020</a:t>
+              <a:t>7/29/2020</a:t>
             </a:fld>
             <a:endParaRPr lang="en-US"/>
           </a:p>
@@ -3339,7 +3341,7 @@
           <a:p>
             <a:fld id="{0422F25E-D946-45B2-AD50-D1BA333F68E0}" type="datetimeFigureOut">
               <a:rPr lang="en-US" smtClean="0"/>
-              <a:t>7/28/2020</a:t>
+              <a:t>7/29/2020</a:t>
             </a:fld>
             <a:endParaRPr lang="en-US"/>
           </a:p>
@@ -3718,7 +3720,7 @@
           <a:p>
             <a:fld id="{0422F25E-D946-45B2-AD50-D1BA333F68E0}" type="datetimeFigureOut">
               <a:rPr lang="en-US" smtClean="0"/>
-              <a:t>7/28/2020</a:t>
+              <a:t>7/29/2020</a:t>
             </a:fld>
             <a:endParaRPr lang="en-US"/>
           </a:p>
@@ -3836,7 +3838,7 @@
           <a:p>
             <a:fld id="{0422F25E-D946-45B2-AD50-D1BA333F68E0}" type="datetimeFigureOut">
               <a:rPr lang="en-US" smtClean="0"/>
-              <a:t>7/28/2020</a:t>
+              <a:t>7/29/2020</a:t>
             </a:fld>
             <a:endParaRPr lang="en-US"/>
           </a:p>
@@ -4007,7 +4009,7 @@
           <a:p>
             <a:fld id="{0422F25E-D946-45B2-AD50-D1BA333F68E0}" type="datetimeFigureOut">
               <a:rPr lang="en-US" smtClean="0"/>
-              <a:t>7/28/2020</a:t>
+              <a:t>7/29/2020</a:t>
             </a:fld>
             <a:endParaRPr lang="en-US"/>
           </a:p>
@@ -4366,7 +4368,7 @@
           <a:p>
             <a:fld id="{0422F25E-D946-45B2-AD50-D1BA333F68E0}" type="datetimeFigureOut">
               <a:rPr lang="en-US" smtClean="0"/>
-              <a:t>7/28/2020</a:t>
+              <a:t>7/29/2020</a:t>
             </a:fld>
             <a:endParaRPr lang="en-US"/>
           </a:p>
@@ -4743,7 +4745,7 @@
           <a:p>
             <a:fld id="{0422F25E-D946-45B2-AD50-D1BA333F68E0}" type="datetimeFigureOut">
               <a:rPr lang="en-US" smtClean="0"/>
-              <a:t>7/28/2020</a:t>
+              <a:t>7/29/2020</a:t>
             </a:fld>
             <a:endParaRPr lang="en-US"/>
           </a:p>
@@ -5030,7 +5032,7 @@
           <a:p>
             <a:fld id="{0422F25E-D946-45B2-AD50-D1BA333F68E0}" type="datetimeFigureOut">
               <a:rPr lang="en-US" smtClean="0"/>
-              <a:t>7/28/2020</a:t>
+              <a:t>7/29/2020</a:t>
             </a:fld>
             <a:endParaRPr lang="en-US"/>
           </a:p>
@@ -7371,476 +7373,10 @@
           <a:chExt cx="0" cy="0"/>
         </a:xfrm>
       </p:grpSpPr>
-      <p:sp>
-        <p:nvSpPr>
-          <p:cNvPr id="2" name="Rounded Rectangle 1"/>
-          <p:cNvSpPr/>
-          <p:nvPr/>
-        </p:nvSpPr>
-        <p:spPr>
-          <a:xfrm>
-            <a:off x="402831" y="510495"/>
-            <a:ext cx="7315200" cy="2286000"/>
-          </a:xfrm>
-          <a:prstGeom prst="roundRect">
-            <a:avLst/>
-          </a:prstGeom>
-          <a:solidFill>
-            <a:schemeClr val="accent1">
-              <a:lumMod val="20000"/>
-              <a:lumOff val="80000"/>
-            </a:schemeClr>
-          </a:solidFill>
-        </p:spPr>
-        <p:style>
-          <a:lnRef idx="1">
-            <a:schemeClr val="accent1"/>
-          </a:lnRef>
-          <a:fillRef idx="2">
-            <a:schemeClr val="accent1"/>
-          </a:fillRef>
-          <a:effectRef idx="1">
-            <a:schemeClr val="accent1"/>
-          </a:effectRef>
-          <a:fontRef idx="minor">
-            <a:schemeClr val="dk1"/>
-          </a:fontRef>
-        </p:style>
-        <p:txBody>
-          <a:bodyPr rtlCol="0" anchor="t"/>
-          <a:lstStyle/>
-          <a:p>
-            <a:r>
-              <a:rPr lang="en-US" sz="4800" b="1" dirty="0"/>
-              <a:t>SAS</a:t>
-            </a:r>
-          </a:p>
-          <a:p>
-            <a:r>
-              <a:rPr lang="en-US" sz="2400" dirty="0" err="1">
-                <a:latin typeface="Courier New" panose="02070309020205020404" pitchFamily="49" charset="0"/>
-                <a:cs typeface="Courier New" panose="02070309020205020404" pitchFamily="49" charset="0"/>
-              </a:rPr>
-              <a:t>proc</a:t>
-            </a:r>
-            <a:r>
-              <a:rPr lang="en-US" sz="2400" dirty="0">
-                <a:latin typeface="Courier New" panose="02070309020205020404" pitchFamily="49" charset="0"/>
-                <a:cs typeface="Courier New" panose="02070309020205020404" pitchFamily="49" charset="0"/>
-              </a:rPr>
-              <a:t> import </a:t>
-            </a:r>
-            <a:r>
-              <a:rPr lang="en-US" sz="2400" dirty="0" err="1">
-                <a:latin typeface="Courier New" panose="02070309020205020404" pitchFamily="49" charset="0"/>
-                <a:cs typeface="Courier New" panose="02070309020205020404" pitchFamily="49" charset="0"/>
-              </a:rPr>
-              <a:t>datafile</a:t>
-            </a:r>
-            <a:r>
-              <a:rPr lang="en-US" sz="2400" dirty="0">
-                <a:latin typeface="Courier New" panose="02070309020205020404" pitchFamily="49" charset="0"/>
-                <a:cs typeface="Courier New" panose="02070309020205020404" pitchFamily="49" charset="0"/>
-              </a:rPr>
-              <a:t>=‘abalone.csv'</a:t>
-            </a:r>
-          </a:p>
-          <a:p>
-            <a:r>
-              <a:rPr lang="en-US" sz="2400" dirty="0">
-                <a:latin typeface="Courier New" panose="02070309020205020404" pitchFamily="49" charset="0"/>
-                <a:cs typeface="Courier New" panose="02070309020205020404" pitchFamily="49" charset="0"/>
-              </a:rPr>
-              <a:t>  out=abalone </a:t>
-            </a:r>
-            <a:r>
-              <a:rPr lang="en-US" sz="2400" dirty="0" err="1">
-                <a:latin typeface="Courier New" panose="02070309020205020404" pitchFamily="49" charset="0"/>
-                <a:cs typeface="Courier New" panose="02070309020205020404" pitchFamily="49" charset="0"/>
-              </a:rPr>
-              <a:t>dbms</a:t>
-            </a:r>
-            <a:r>
-              <a:rPr lang="en-US" sz="2400" dirty="0">
-                <a:latin typeface="Courier New" panose="02070309020205020404" pitchFamily="49" charset="0"/>
-                <a:cs typeface="Courier New" panose="02070309020205020404" pitchFamily="49" charset="0"/>
-              </a:rPr>
-              <a:t>=csv;</a:t>
-            </a:r>
-          </a:p>
-          <a:p>
-            <a:r>
-              <a:rPr lang="en-US" sz="2400" dirty="0">
-                <a:latin typeface="Courier New" panose="02070309020205020404" pitchFamily="49" charset="0"/>
-                <a:cs typeface="Courier New" panose="02070309020205020404" pitchFamily="49" charset="0"/>
-              </a:rPr>
-              <a:t>run;</a:t>
-            </a:r>
-            <a:endParaRPr lang="en-US" sz="4000" dirty="0">
-              <a:latin typeface="Courier New" panose="02070309020205020404" pitchFamily="49" charset="0"/>
-              <a:cs typeface="Courier New" panose="02070309020205020404" pitchFamily="49" charset="0"/>
-            </a:endParaRPr>
-          </a:p>
-        </p:txBody>
-      </p:sp>
-      <p:sp>
-        <p:nvSpPr>
-          <p:cNvPr id="3" name="Rounded Rectangle 2"/>
-          <p:cNvSpPr/>
-          <p:nvPr/>
-        </p:nvSpPr>
-        <p:spPr>
-          <a:xfrm>
-            <a:off x="402831" y="3371500"/>
-            <a:ext cx="7315200" cy="2286000"/>
-          </a:xfrm>
-          <a:prstGeom prst="roundRect">
-            <a:avLst/>
-          </a:prstGeom>
-          <a:solidFill>
-            <a:schemeClr val="accent4">
-              <a:lumMod val="20000"/>
-              <a:lumOff val="80000"/>
-            </a:schemeClr>
-          </a:solidFill>
-        </p:spPr>
-        <p:style>
-          <a:lnRef idx="1">
-            <a:schemeClr val="accent4"/>
-          </a:lnRef>
-          <a:fillRef idx="2">
-            <a:schemeClr val="accent4"/>
-          </a:fillRef>
-          <a:effectRef idx="1">
-            <a:schemeClr val="accent4"/>
-          </a:effectRef>
-          <a:fontRef idx="minor">
-            <a:schemeClr val="dk1"/>
-          </a:fontRef>
-        </p:style>
-        <p:txBody>
-          <a:bodyPr rtlCol="0" anchor="t"/>
-          <a:lstStyle/>
-          <a:p>
-            <a:r>
-              <a:rPr lang="en-US" sz="4800" b="1" dirty="0"/>
-              <a:t>R</a:t>
-            </a:r>
-            <a:endParaRPr lang="en-US" sz="4800" dirty="0">
-              <a:latin typeface="+mj-lt"/>
-            </a:endParaRPr>
-          </a:p>
-          <a:p>
-            <a:r>
-              <a:rPr lang="en-US" sz="2400" dirty="0">
-                <a:latin typeface="Courier New" panose="02070309020205020404" pitchFamily="49" charset="0"/>
-                <a:cs typeface="Courier New" panose="02070309020205020404" pitchFamily="49" charset="0"/>
-              </a:rPr>
-              <a:t>library(</a:t>
-            </a:r>
-            <a:r>
-              <a:rPr lang="en-US" sz="2400" dirty="0" err="1">
-                <a:latin typeface="Courier New" panose="02070309020205020404" pitchFamily="49" charset="0"/>
-                <a:cs typeface="Courier New" panose="02070309020205020404" pitchFamily="49" charset="0"/>
-              </a:rPr>
-              <a:t>readr</a:t>
-            </a:r>
-            <a:r>
-              <a:rPr lang="en-US" sz="2400" dirty="0">
-                <a:latin typeface="Courier New" panose="02070309020205020404" pitchFamily="49" charset="0"/>
-                <a:cs typeface="Courier New" panose="02070309020205020404" pitchFamily="49" charset="0"/>
-              </a:rPr>
-              <a:t>)</a:t>
-            </a:r>
-          </a:p>
-          <a:p>
-            <a:r>
-              <a:rPr lang="en-US" sz="2400" dirty="0">
-                <a:latin typeface="Courier New" panose="02070309020205020404" pitchFamily="49" charset="0"/>
-                <a:cs typeface="Courier New" panose="02070309020205020404" pitchFamily="49" charset="0"/>
-              </a:rPr>
-              <a:t>abalone &lt;-</a:t>
-            </a:r>
-          </a:p>
-          <a:p>
-            <a:r>
-              <a:rPr lang="en-US" sz="2400" dirty="0">
-                <a:latin typeface="Courier New" panose="02070309020205020404" pitchFamily="49" charset="0"/>
-                <a:cs typeface="Courier New" panose="02070309020205020404" pitchFamily="49" charset="0"/>
-              </a:rPr>
-              <a:t>  </a:t>
-            </a:r>
-            <a:r>
-              <a:rPr lang="en-US" sz="2400" dirty="0" err="1">
-                <a:latin typeface="Courier New" panose="02070309020205020404" pitchFamily="49" charset="0"/>
-                <a:cs typeface="Courier New" panose="02070309020205020404" pitchFamily="49" charset="0"/>
-              </a:rPr>
-              <a:t>readr</a:t>
-            </a:r>
-            <a:r>
-              <a:rPr lang="en-US" sz="2400" dirty="0">
-                <a:latin typeface="Courier New" panose="02070309020205020404" pitchFamily="49" charset="0"/>
-                <a:cs typeface="Courier New" panose="02070309020205020404" pitchFamily="49" charset="0"/>
-              </a:rPr>
-              <a:t>::</a:t>
-            </a:r>
-            <a:r>
-              <a:rPr lang="en-US" sz="2400" dirty="0" err="1">
-                <a:latin typeface="Courier New" panose="02070309020205020404" pitchFamily="49" charset="0"/>
-                <a:cs typeface="Courier New" panose="02070309020205020404" pitchFamily="49" charset="0"/>
-              </a:rPr>
-              <a:t>read_csv</a:t>
-            </a:r>
-            <a:r>
-              <a:rPr lang="en-US" sz="2400" dirty="0">
-                <a:latin typeface="Courier New" panose="02070309020205020404" pitchFamily="49" charset="0"/>
-                <a:cs typeface="Courier New" panose="02070309020205020404" pitchFamily="49" charset="0"/>
-              </a:rPr>
-              <a:t>("abalone.csv")</a:t>
-            </a:r>
-          </a:p>
-        </p:txBody>
-      </p:sp>
-      <p:pic>
-        <p:nvPicPr>
-          <p:cNvPr id="4" name="Picture 3"/>
-          <p:cNvPicPr>
-            <a:picLocks noChangeAspect="1"/>
-          </p:cNvPicPr>
-          <p:nvPr/>
-        </p:nvPicPr>
-        <p:blipFill>
-          <a:blip r:embed="rId3">
-            <a:extLst>
-              <a:ext uri="{28A0092B-C50C-407E-A947-70E740481C1C}">
-                <a14:useLocalDpi xmlns:a14="http://schemas.microsoft.com/office/drawing/2010/main" val="0"/>
-              </a:ext>
-            </a:extLst>
-          </a:blip>
-          <a:stretch>
-            <a:fillRect/>
-          </a:stretch>
-        </p:blipFill>
-        <p:spPr>
-          <a:xfrm>
-            <a:off x="9199017" y="906968"/>
-            <a:ext cx="1450193" cy="1493055"/>
-          </a:xfrm>
-          <a:prstGeom prst="rect">
-            <a:avLst/>
-          </a:prstGeom>
-        </p:spPr>
-      </p:pic>
-      <p:sp>
-        <p:nvSpPr>
-          <p:cNvPr id="6" name="TextBox 5"/>
-          <p:cNvSpPr txBox="1"/>
-          <p:nvPr/>
-        </p:nvSpPr>
-        <p:spPr>
-          <a:xfrm>
-            <a:off x="8633535" y="4099002"/>
-            <a:ext cx="2581156" cy="830997"/>
-          </a:xfrm>
-          <a:prstGeom prst="rect">
-            <a:avLst/>
-          </a:prstGeom>
-          <a:noFill/>
-        </p:spPr>
-        <p:txBody>
-          <a:bodyPr wrap="none" rtlCol="0">
-            <a:spAutoFit/>
-          </a:bodyPr>
-          <a:lstStyle/>
-          <a:p>
-            <a:r>
-              <a:rPr lang="en-US" sz="2400" b="1" dirty="0">
-                <a:solidFill>
-                  <a:srgbClr val="0070C0"/>
-                </a:solidFill>
-                <a:latin typeface="Courier New" panose="02070309020205020404" pitchFamily="49" charset="0"/>
-                <a:cs typeface="Courier New" panose="02070309020205020404" pitchFamily="49" charset="0"/>
-              </a:rPr>
-              <a:t>&gt; ls()</a:t>
-            </a:r>
-          </a:p>
-          <a:p>
-            <a:r>
-              <a:rPr lang="en-US" sz="2400" b="1" dirty="0">
-                <a:latin typeface="Courier New" panose="02070309020205020404" pitchFamily="49" charset="0"/>
-                <a:cs typeface="Courier New" panose="02070309020205020404" pitchFamily="49" charset="0"/>
-              </a:rPr>
-              <a:t>[1] "abalone"</a:t>
-            </a:r>
-          </a:p>
-        </p:txBody>
-      </p:sp>
-      <p:sp>
-        <p:nvSpPr>
-          <p:cNvPr id="5" name="Right Arrow 4"/>
-          <p:cNvSpPr/>
-          <p:nvPr/>
-        </p:nvSpPr>
-        <p:spPr>
-          <a:xfrm>
-            <a:off x="7124467" y="1412273"/>
-            <a:ext cx="1929776" cy="482444"/>
-          </a:xfrm>
-          <a:prstGeom prst="rightArrow">
-            <a:avLst/>
-          </a:prstGeom>
-          <a:solidFill>
-            <a:srgbClr val="7030A0">
-              <a:alpha val="80000"/>
-            </a:srgbClr>
-          </a:solidFill>
-          <a:ln>
-            <a:solidFill>
-              <a:schemeClr val="tx1"/>
-            </a:solidFill>
-          </a:ln>
-        </p:spPr>
-        <p:style>
-          <a:lnRef idx="2">
-            <a:schemeClr val="accent1">
-              <a:shade val="50000"/>
-            </a:schemeClr>
-          </a:lnRef>
-          <a:fillRef idx="1">
-            <a:schemeClr val="accent1"/>
-          </a:fillRef>
-          <a:effectRef idx="0">
-            <a:schemeClr val="accent1"/>
-          </a:effectRef>
-          <a:fontRef idx="minor">
-            <a:schemeClr val="lt1"/>
-          </a:fontRef>
-        </p:style>
-        <p:txBody>
-          <a:bodyPr rtlCol="0" anchor="ctr"/>
-          <a:lstStyle/>
-          <a:p>
-            <a:pPr algn="ctr"/>
-            <a:endParaRPr lang="en-US"/>
-          </a:p>
-        </p:txBody>
-      </p:sp>
-      <p:sp>
-        <p:nvSpPr>
-          <p:cNvPr id="12" name="Right Arrow 11"/>
-          <p:cNvSpPr/>
-          <p:nvPr/>
-        </p:nvSpPr>
-        <p:spPr>
-          <a:xfrm>
-            <a:off x="6570030" y="4273278"/>
-            <a:ext cx="1929776" cy="482444"/>
-          </a:xfrm>
-          <a:prstGeom prst="rightArrow">
-            <a:avLst/>
-          </a:prstGeom>
-          <a:solidFill>
-            <a:srgbClr val="7030A0">
-              <a:alpha val="80000"/>
-            </a:srgbClr>
-          </a:solidFill>
-          <a:ln>
-            <a:solidFill>
-              <a:schemeClr val="tx1"/>
-            </a:solidFill>
-          </a:ln>
-        </p:spPr>
-        <p:style>
-          <a:lnRef idx="2">
-            <a:schemeClr val="accent1">
-              <a:shade val="50000"/>
-            </a:schemeClr>
-          </a:lnRef>
-          <a:fillRef idx="1">
-            <a:schemeClr val="accent1"/>
-          </a:fillRef>
-          <a:effectRef idx="0">
-            <a:schemeClr val="accent1"/>
-          </a:effectRef>
-          <a:fontRef idx="minor">
-            <a:schemeClr val="lt1"/>
-          </a:fontRef>
-        </p:style>
-        <p:txBody>
-          <a:bodyPr rtlCol="0" anchor="ctr"/>
-          <a:lstStyle/>
-          <a:p>
-            <a:pPr algn="ctr"/>
-            <a:endParaRPr lang="en-US"/>
-          </a:p>
-        </p:txBody>
-      </p:sp>
-      <p:sp>
-        <p:nvSpPr>
-          <p:cNvPr id="7" name="TextBox 6"/>
-          <p:cNvSpPr txBox="1"/>
-          <p:nvPr/>
-        </p:nvSpPr>
-        <p:spPr>
-          <a:xfrm>
-            <a:off x="8695475" y="322193"/>
-            <a:ext cx="2457276" cy="584775"/>
-          </a:xfrm>
-          <a:prstGeom prst="rect">
-            <a:avLst/>
-          </a:prstGeom>
-          <a:noFill/>
-        </p:spPr>
-        <p:txBody>
-          <a:bodyPr wrap="none" rtlCol="0">
-            <a:spAutoFit/>
-          </a:bodyPr>
-          <a:lstStyle/>
-          <a:p>
-            <a:r>
-              <a:rPr lang="en-US" sz="3200" dirty="0">
-                <a:latin typeface="+mj-lt"/>
-              </a:rPr>
-              <a:t>WORK Library</a:t>
-            </a:r>
-          </a:p>
-        </p:txBody>
-      </p:sp>
-      <p:sp>
-        <p:nvSpPr>
-          <p:cNvPr id="14" name="TextBox 13"/>
-          <p:cNvSpPr txBox="1"/>
-          <p:nvPr/>
-        </p:nvSpPr>
-        <p:spPr>
-          <a:xfrm>
-            <a:off x="8197422" y="3371500"/>
-            <a:ext cx="3453381" cy="584775"/>
-          </a:xfrm>
-          <a:prstGeom prst="rect">
-            <a:avLst/>
-          </a:prstGeom>
-          <a:noFill/>
-        </p:spPr>
-        <p:txBody>
-          <a:bodyPr wrap="none" rtlCol="0">
-            <a:spAutoFit/>
-          </a:bodyPr>
-          <a:lstStyle/>
-          <a:p>
-            <a:r>
-              <a:rPr lang="en-US" sz="3200" dirty="0">
-                <a:latin typeface="+mj-lt"/>
-              </a:rPr>
-              <a:t>Global Environment</a:t>
-            </a:r>
-          </a:p>
-        </p:txBody>
-      </p:sp>
     </p:spTree>
     <p:extLst>
       <p:ext uri="{BB962C8B-B14F-4D97-AF65-F5344CB8AC3E}">
-        <p14:creationId xmlns:p14="http://schemas.microsoft.com/office/powerpoint/2010/main" val="3345818502"/>
+        <p14:creationId xmlns:p14="http://schemas.microsoft.com/office/powerpoint/2010/main" val="1656690759"/>
       </p:ext>
     </p:extLst>
   </p:cSld>
@@ -8097,209 +7633,9 @@
           </a:p>
         </p:txBody>
       </p:sp>
-      <p:sp>
-        <p:nvSpPr>
-          <p:cNvPr id="8" name="Rounded Rectangle 7"/>
-          <p:cNvSpPr/>
-          <p:nvPr/>
-        </p:nvSpPr>
-        <p:spPr>
-          <a:xfrm>
-            <a:off x="1480991" y="1368795"/>
-            <a:ext cx="1211721" cy="426346"/>
-          </a:xfrm>
-          <a:prstGeom prst="roundRect">
-            <a:avLst/>
-          </a:prstGeom>
-          <a:solidFill>
-            <a:srgbClr val="7030A0">
-              <a:alpha val="30196"/>
-            </a:srgbClr>
-          </a:solidFill>
-          <a:ln>
-            <a:solidFill>
-              <a:srgbClr val="00B050"/>
-            </a:solidFill>
-          </a:ln>
-        </p:spPr>
-        <p:style>
-          <a:lnRef idx="2">
-            <a:schemeClr val="accent1">
-              <a:shade val="50000"/>
-            </a:schemeClr>
-          </a:lnRef>
-          <a:fillRef idx="1">
-            <a:schemeClr val="accent1"/>
-          </a:fillRef>
-          <a:effectRef idx="0">
-            <a:schemeClr val="accent1"/>
-          </a:effectRef>
-          <a:fontRef idx="minor">
-            <a:schemeClr val="lt1"/>
-          </a:fontRef>
-        </p:style>
-        <p:txBody>
-          <a:bodyPr rtlCol="0" anchor="ctr"/>
-          <a:lstStyle/>
-          <a:p>
-            <a:pPr algn="ctr"/>
-            <a:endParaRPr lang="en-US"/>
-          </a:p>
-        </p:txBody>
-      </p:sp>
-      <p:sp>
-        <p:nvSpPr>
-          <p:cNvPr id="10" name="Rounded Rectangle 9"/>
-          <p:cNvSpPr/>
-          <p:nvPr/>
-        </p:nvSpPr>
-        <p:spPr>
-          <a:xfrm>
-            <a:off x="3080723" y="1795141"/>
-            <a:ext cx="1811037" cy="426346"/>
-          </a:xfrm>
-          <a:prstGeom prst="roundRect">
-            <a:avLst/>
-          </a:prstGeom>
-          <a:solidFill>
-            <a:srgbClr val="7030A0">
-              <a:alpha val="30196"/>
-            </a:srgbClr>
-          </a:solidFill>
-          <a:ln>
-            <a:solidFill>
-              <a:srgbClr val="00B050"/>
-            </a:solidFill>
-          </a:ln>
-        </p:spPr>
-        <p:style>
-          <a:lnRef idx="2">
-            <a:schemeClr val="accent1">
-              <a:shade val="50000"/>
-            </a:schemeClr>
-          </a:lnRef>
-          <a:fillRef idx="1">
-            <a:schemeClr val="accent1"/>
-          </a:fillRef>
-          <a:effectRef idx="0">
-            <a:schemeClr val="accent1"/>
-          </a:effectRef>
-          <a:fontRef idx="minor">
-            <a:schemeClr val="lt1"/>
-          </a:fontRef>
-        </p:style>
-        <p:txBody>
-          <a:bodyPr rtlCol="0" anchor="ctr"/>
-          <a:lstStyle/>
-          <a:p>
-            <a:pPr algn="ctr"/>
-            <a:endParaRPr lang="en-US"/>
-          </a:p>
-        </p:txBody>
-      </p:sp>
-      <p:sp>
-        <p:nvSpPr>
-          <p:cNvPr id="11" name="Rounded Rectangle 10"/>
-          <p:cNvSpPr/>
-          <p:nvPr/>
-        </p:nvSpPr>
-        <p:spPr>
-          <a:xfrm>
-            <a:off x="875130" y="4988061"/>
-            <a:ext cx="2883447" cy="426346"/>
-          </a:xfrm>
-          <a:prstGeom prst="roundRect">
-            <a:avLst/>
-          </a:prstGeom>
-          <a:solidFill>
-            <a:srgbClr val="7030A0">
-              <a:alpha val="30196"/>
-            </a:srgbClr>
-          </a:solidFill>
-          <a:ln>
-            <a:solidFill>
-              <a:srgbClr val="00B050"/>
-            </a:solidFill>
-          </a:ln>
-        </p:spPr>
-        <p:style>
-          <a:lnRef idx="2">
-            <a:schemeClr val="accent1">
-              <a:shade val="50000"/>
-            </a:schemeClr>
-          </a:lnRef>
-          <a:fillRef idx="1">
-            <a:schemeClr val="accent1"/>
-          </a:fillRef>
-          <a:effectRef idx="0">
-            <a:schemeClr val="accent1"/>
-          </a:effectRef>
-          <a:fontRef idx="minor">
-            <a:schemeClr val="lt1"/>
-          </a:fontRef>
-        </p:style>
-        <p:txBody>
-          <a:bodyPr rtlCol="0" anchor="ctr"/>
-          <a:lstStyle/>
-          <a:p>
-            <a:pPr algn="ctr"/>
-            <a:endParaRPr lang="en-US"/>
-          </a:p>
-        </p:txBody>
-      </p:sp>
-      <p:sp>
-        <p:nvSpPr>
-          <p:cNvPr id="13" name="Rounded Rectangle 12"/>
-          <p:cNvSpPr/>
-          <p:nvPr/>
-        </p:nvSpPr>
-        <p:spPr>
-          <a:xfrm>
-            <a:off x="567526" y="4199883"/>
-            <a:ext cx="2618849" cy="426346"/>
-          </a:xfrm>
-          <a:prstGeom prst="roundRect">
-            <a:avLst/>
-          </a:prstGeom>
-          <a:solidFill>
-            <a:srgbClr val="7030A0">
-              <a:alpha val="30196"/>
-            </a:srgbClr>
-          </a:solidFill>
-          <a:ln>
-            <a:solidFill>
-              <a:srgbClr val="00B050"/>
-            </a:solidFill>
-          </a:ln>
-        </p:spPr>
-        <p:style>
-          <a:lnRef idx="2">
-            <a:schemeClr val="accent1">
-              <a:shade val="50000"/>
-            </a:schemeClr>
-          </a:lnRef>
-          <a:fillRef idx="1">
-            <a:schemeClr val="accent1"/>
-          </a:fillRef>
-          <a:effectRef idx="0">
-            <a:schemeClr val="accent1"/>
-          </a:effectRef>
-          <a:fontRef idx="minor">
-            <a:schemeClr val="lt1"/>
-          </a:fontRef>
-        </p:style>
-        <p:txBody>
-          <a:bodyPr rtlCol="0" anchor="ctr"/>
-          <a:lstStyle/>
-          <a:p>
-            <a:pPr algn="ctr"/>
-            <a:endParaRPr lang="en-US"/>
-          </a:p>
-        </p:txBody>
-      </p:sp>
       <p:pic>
         <p:nvPicPr>
-          <p:cNvPr id="16" name="Picture 15"/>
+          <p:cNvPr id="4" name="Picture 3"/>
           <p:cNvPicPr>
             <a:picLocks noChangeAspect="1"/>
           </p:cNvPicPr>
@@ -8329,7 +7665,7 @@
       </p:pic>
       <p:sp>
         <p:nvSpPr>
-          <p:cNvPr id="17" name="TextBox 16"/>
+          <p:cNvPr id="6" name="TextBox 5"/>
           <p:cNvSpPr txBox="1"/>
           <p:nvPr/>
         </p:nvSpPr>
@@ -8373,7 +7709,7 @@
       </p:sp>
       <p:sp>
         <p:nvSpPr>
-          <p:cNvPr id="18" name="Right Arrow 17"/>
+          <p:cNvPr id="5" name="Right Arrow 4"/>
           <p:cNvSpPr/>
           <p:nvPr/>
         </p:nvSpPr>
@@ -8423,7 +7759,7 @@
       </p:sp>
       <p:sp>
         <p:nvSpPr>
-          <p:cNvPr id="19" name="Right Arrow 18"/>
+          <p:cNvPr id="12" name="Right Arrow 11"/>
           <p:cNvSpPr/>
           <p:nvPr/>
         </p:nvSpPr>
@@ -8473,7 +7809,7 @@
       </p:sp>
       <p:sp>
         <p:nvSpPr>
-          <p:cNvPr id="20" name="TextBox 19"/>
+          <p:cNvPr id="7" name="TextBox 6"/>
           <p:cNvSpPr txBox="1"/>
           <p:nvPr/>
         </p:nvSpPr>
@@ -8504,7 +7840,7 @@
       </p:sp>
       <p:sp>
         <p:nvSpPr>
-          <p:cNvPr id="21" name="TextBox 20"/>
+          <p:cNvPr id="14" name="TextBox 13"/>
           <p:cNvSpPr txBox="1"/>
           <p:nvPr/>
         </p:nvSpPr>
@@ -8536,7 +7872,7 @@
     </p:spTree>
     <p:extLst>
       <p:ext uri="{BB962C8B-B14F-4D97-AF65-F5344CB8AC3E}">
-        <p14:creationId xmlns:p14="http://schemas.microsoft.com/office/powerpoint/2010/main" val="3215870278"/>
+        <p14:creationId xmlns:p14="http://schemas.microsoft.com/office/powerpoint/2010/main" val="3345818502"/>
       </p:ext>
     </p:extLst>
   </p:cSld>
@@ -8795,14 +8131,14 @@
       </p:sp>
       <p:sp>
         <p:nvSpPr>
-          <p:cNvPr id="12" name="Rounded Rectangle 11"/>
+          <p:cNvPr id="8" name="Rounded Rectangle 7"/>
           <p:cNvSpPr/>
           <p:nvPr/>
         </p:nvSpPr>
         <p:spPr>
           <a:xfrm>
-            <a:off x="2737590" y="1368795"/>
-            <a:ext cx="4140044" cy="426346"/>
+            <a:off x="1480991" y="1368795"/>
+            <a:ext cx="1211721" cy="426346"/>
           </a:xfrm>
           <a:prstGeom prst="roundRect">
             <a:avLst/>
@@ -8845,14 +8181,14 @@
       </p:sp>
       <p:sp>
         <p:nvSpPr>
-          <p:cNvPr id="14" name="Rounded Rectangle 13"/>
+          <p:cNvPr id="10" name="Rounded Rectangle 9"/>
           <p:cNvSpPr/>
           <p:nvPr/>
         </p:nvSpPr>
         <p:spPr>
           <a:xfrm>
-            <a:off x="3742682" y="4976842"/>
-            <a:ext cx="2742265" cy="426346"/>
+            <a:off x="3080723" y="1795141"/>
+            <a:ext cx="1811037" cy="426346"/>
           </a:xfrm>
           <a:prstGeom prst="roundRect">
             <a:avLst/>
@@ -8893,9 +8229,109 @@
           </a:p>
         </p:txBody>
       </p:sp>
+      <p:sp>
+        <p:nvSpPr>
+          <p:cNvPr id="11" name="Rounded Rectangle 10"/>
+          <p:cNvSpPr/>
+          <p:nvPr/>
+        </p:nvSpPr>
+        <p:spPr>
+          <a:xfrm>
+            <a:off x="875130" y="4988061"/>
+            <a:ext cx="2883447" cy="426346"/>
+          </a:xfrm>
+          <a:prstGeom prst="roundRect">
+            <a:avLst/>
+          </a:prstGeom>
+          <a:solidFill>
+            <a:srgbClr val="7030A0">
+              <a:alpha val="30196"/>
+            </a:srgbClr>
+          </a:solidFill>
+          <a:ln>
+            <a:solidFill>
+              <a:srgbClr val="00B050"/>
+            </a:solidFill>
+          </a:ln>
+        </p:spPr>
+        <p:style>
+          <a:lnRef idx="2">
+            <a:schemeClr val="accent1">
+              <a:shade val="50000"/>
+            </a:schemeClr>
+          </a:lnRef>
+          <a:fillRef idx="1">
+            <a:schemeClr val="accent1"/>
+          </a:fillRef>
+          <a:effectRef idx="0">
+            <a:schemeClr val="accent1"/>
+          </a:effectRef>
+          <a:fontRef idx="minor">
+            <a:schemeClr val="lt1"/>
+          </a:fontRef>
+        </p:style>
+        <p:txBody>
+          <a:bodyPr rtlCol="0" anchor="ctr"/>
+          <a:lstStyle/>
+          <a:p>
+            <a:pPr algn="ctr"/>
+            <a:endParaRPr lang="en-US"/>
+          </a:p>
+        </p:txBody>
+      </p:sp>
+      <p:sp>
+        <p:nvSpPr>
+          <p:cNvPr id="13" name="Rounded Rectangle 12"/>
+          <p:cNvSpPr/>
+          <p:nvPr/>
+        </p:nvSpPr>
+        <p:spPr>
+          <a:xfrm>
+            <a:off x="567526" y="4199883"/>
+            <a:ext cx="2618849" cy="426346"/>
+          </a:xfrm>
+          <a:prstGeom prst="roundRect">
+            <a:avLst/>
+          </a:prstGeom>
+          <a:solidFill>
+            <a:srgbClr val="7030A0">
+              <a:alpha val="30196"/>
+            </a:srgbClr>
+          </a:solidFill>
+          <a:ln>
+            <a:solidFill>
+              <a:srgbClr val="00B050"/>
+            </a:solidFill>
+          </a:ln>
+        </p:spPr>
+        <p:style>
+          <a:lnRef idx="2">
+            <a:schemeClr val="accent1">
+              <a:shade val="50000"/>
+            </a:schemeClr>
+          </a:lnRef>
+          <a:fillRef idx="1">
+            <a:schemeClr val="accent1"/>
+          </a:fillRef>
+          <a:effectRef idx="0">
+            <a:schemeClr val="accent1"/>
+          </a:effectRef>
+          <a:fontRef idx="minor">
+            <a:schemeClr val="lt1"/>
+          </a:fontRef>
+        </p:style>
+        <p:txBody>
+          <a:bodyPr rtlCol="0" anchor="ctr"/>
+          <a:lstStyle/>
+          <a:p>
+            <a:pPr algn="ctr"/>
+            <a:endParaRPr lang="en-US"/>
+          </a:p>
+        </p:txBody>
+      </p:sp>
       <p:pic>
         <p:nvPicPr>
-          <p:cNvPr id="17" name="Picture 16"/>
+          <p:cNvPr id="16" name="Picture 15"/>
           <p:cNvPicPr>
             <a:picLocks noChangeAspect="1"/>
           </p:cNvPicPr>
@@ -8925,7 +8361,7 @@
       </p:pic>
       <p:sp>
         <p:nvSpPr>
-          <p:cNvPr id="18" name="TextBox 17"/>
+          <p:cNvPr id="17" name="TextBox 16"/>
           <p:cNvSpPr txBox="1"/>
           <p:nvPr/>
         </p:nvSpPr>
@@ -8969,7 +8405,7 @@
       </p:sp>
       <p:sp>
         <p:nvSpPr>
-          <p:cNvPr id="19" name="Right Arrow 18"/>
+          <p:cNvPr id="18" name="Right Arrow 17"/>
           <p:cNvSpPr/>
           <p:nvPr/>
         </p:nvSpPr>
@@ -9019,7 +8455,7 @@
       </p:sp>
       <p:sp>
         <p:nvSpPr>
-          <p:cNvPr id="20" name="Right Arrow 19"/>
+          <p:cNvPr id="19" name="Right Arrow 18"/>
           <p:cNvSpPr/>
           <p:nvPr/>
         </p:nvSpPr>
@@ -9069,7 +8505,7 @@
       </p:sp>
       <p:sp>
         <p:nvSpPr>
-          <p:cNvPr id="21" name="TextBox 20"/>
+          <p:cNvPr id="20" name="TextBox 19"/>
           <p:cNvSpPr txBox="1"/>
           <p:nvPr/>
         </p:nvSpPr>
@@ -9100,7 +8536,7 @@
       </p:sp>
       <p:sp>
         <p:nvSpPr>
-          <p:cNvPr id="22" name="TextBox 21"/>
+          <p:cNvPr id="21" name="TextBox 20"/>
           <p:cNvSpPr txBox="1"/>
           <p:nvPr/>
         </p:nvSpPr>
@@ -9132,7 +8568,7 @@
     </p:spTree>
     <p:extLst>
       <p:ext uri="{BB962C8B-B14F-4D97-AF65-F5344CB8AC3E}">
-        <p14:creationId xmlns:p14="http://schemas.microsoft.com/office/powerpoint/2010/main" val="3095158126"/>
+        <p14:creationId xmlns:p14="http://schemas.microsoft.com/office/powerpoint/2010/main" val="3215870278"/>
       </p:ext>
     </p:extLst>
   </p:cSld>
@@ -9541,8 +8977,8 @@
         </p:nvSpPr>
         <p:spPr>
           <a:xfrm>
-            <a:off x="920010" y="1761483"/>
-            <a:ext cx="2120510" cy="426346"/>
+            <a:off x="2737590" y="1368795"/>
+            <a:ext cx="4140044" cy="426346"/>
           </a:xfrm>
           <a:prstGeom prst="roundRect">
             <a:avLst/>
@@ -9591,8 +9027,8 @@
         </p:nvSpPr>
         <p:spPr>
           <a:xfrm>
-            <a:off x="556307" y="4629034"/>
-            <a:ext cx="1407129" cy="426346"/>
+            <a:off x="3742682" y="4976842"/>
+            <a:ext cx="2742265" cy="426346"/>
           </a:xfrm>
           <a:prstGeom prst="roundRect">
             <a:avLst/>
@@ -9635,7 +9071,7 @@
       </p:sp>
       <p:pic>
         <p:nvPicPr>
-          <p:cNvPr id="10" name="Picture 9"/>
+          <p:cNvPr id="17" name="Picture 16"/>
           <p:cNvPicPr>
             <a:picLocks noChangeAspect="1"/>
           </p:cNvPicPr>
@@ -9665,7 +9101,7 @@
       </p:pic>
       <p:sp>
         <p:nvSpPr>
-          <p:cNvPr id="11" name="TextBox 10"/>
+          <p:cNvPr id="18" name="TextBox 17"/>
           <p:cNvSpPr txBox="1"/>
           <p:nvPr/>
         </p:nvSpPr>
@@ -9709,7 +9145,7 @@
       </p:sp>
       <p:sp>
         <p:nvSpPr>
-          <p:cNvPr id="13" name="Right Arrow 12"/>
+          <p:cNvPr id="19" name="Right Arrow 18"/>
           <p:cNvSpPr/>
           <p:nvPr/>
         </p:nvSpPr>
@@ -9759,7 +9195,7 @@
       </p:sp>
       <p:sp>
         <p:nvSpPr>
-          <p:cNvPr id="15" name="Right Arrow 14"/>
+          <p:cNvPr id="20" name="Right Arrow 19"/>
           <p:cNvSpPr/>
           <p:nvPr/>
         </p:nvSpPr>
@@ -9809,7 +9245,7 @@
       </p:sp>
       <p:sp>
         <p:nvSpPr>
-          <p:cNvPr id="16" name="TextBox 15"/>
+          <p:cNvPr id="21" name="TextBox 20"/>
           <p:cNvSpPr txBox="1"/>
           <p:nvPr/>
         </p:nvSpPr>
@@ -9840,7 +9276,7 @@
       </p:sp>
       <p:sp>
         <p:nvSpPr>
-          <p:cNvPr id="17" name="TextBox 16"/>
+          <p:cNvPr id="22" name="TextBox 21"/>
           <p:cNvSpPr txBox="1"/>
           <p:nvPr/>
         </p:nvSpPr>
@@ -9872,7 +9308,7 @@
     </p:spTree>
     <p:extLst>
       <p:ext uri="{BB962C8B-B14F-4D97-AF65-F5344CB8AC3E}">
-        <p14:creationId xmlns:p14="http://schemas.microsoft.com/office/powerpoint/2010/main" val="361446460"/>
+        <p14:creationId xmlns:p14="http://schemas.microsoft.com/office/powerpoint/2010/main" val="3095158126"/>
       </p:ext>
     </p:extLst>
   </p:cSld>
@@ -9907,8 +9343,8 @@
         </p:nvSpPr>
         <p:spPr>
           <a:xfrm>
-            <a:off x="77463" y="2193439"/>
-            <a:ext cx="5722917" cy="1761481"/>
+            <a:off x="402831" y="510495"/>
+            <a:ext cx="7315200" cy="2286000"/>
           </a:xfrm>
           <a:prstGeom prst="roundRect">
             <a:avLst/>
@@ -9939,7 +9375,7 @@
           <a:lstStyle/>
           <a:p>
             <a:r>
-              <a:rPr lang="en-US" sz="4400" b="1" dirty="0"/>
+              <a:rPr lang="en-US" sz="4800" b="1" dirty="0"/>
               <a:t>SAS</a:t>
             </a:r>
           </a:p>
@@ -9956,7 +9392,44 @@
                 <a:latin typeface="Courier New" panose="02070309020205020404" pitchFamily="49" charset="0"/>
                 <a:cs typeface="Courier New" panose="02070309020205020404" pitchFamily="49" charset="0"/>
               </a:rPr>
-              <a:t> contents data=abalone;</a:t>
+              <a:t> import </a:t>
+            </a:r>
+            <a:r>
+              <a:rPr lang="en-US" sz="2400" dirty="0" err="1">
+                <a:latin typeface="Courier New" panose="02070309020205020404" pitchFamily="49" charset="0"/>
+                <a:cs typeface="Courier New" panose="02070309020205020404" pitchFamily="49" charset="0"/>
+              </a:rPr>
+              <a:t>datafile</a:t>
+            </a:r>
+            <a:r>
+              <a:rPr lang="en-US" sz="2400" dirty="0">
+                <a:latin typeface="Courier New" panose="02070309020205020404" pitchFamily="49" charset="0"/>
+                <a:cs typeface="Courier New" panose="02070309020205020404" pitchFamily="49" charset="0"/>
+              </a:rPr>
+              <a:t>=‘abalone.csv'</a:t>
+            </a:r>
+          </a:p>
+          <a:p>
+            <a:r>
+              <a:rPr lang="en-US" sz="2400" dirty="0">
+                <a:latin typeface="Courier New" panose="02070309020205020404" pitchFamily="49" charset="0"/>
+                <a:cs typeface="Courier New" panose="02070309020205020404" pitchFamily="49" charset="0"/>
+              </a:rPr>
+              <a:t>  out=abalone </a:t>
+            </a:r>
+            <a:r>
+              <a:rPr lang="en-US" sz="2400" dirty="0" err="1">
+                <a:latin typeface="Courier New" panose="02070309020205020404" pitchFamily="49" charset="0"/>
+                <a:cs typeface="Courier New" panose="02070309020205020404" pitchFamily="49" charset="0"/>
+              </a:rPr>
+              <a:t>dbms</a:t>
+            </a:r>
+            <a:r>
+              <a:rPr lang="en-US" sz="2400" dirty="0">
+                <a:latin typeface="Courier New" panose="02070309020205020404" pitchFamily="49" charset="0"/>
+                <a:cs typeface="Courier New" panose="02070309020205020404" pitchFamily="49" charset="0"/>
+              </a:rPr>
+              <a:t>=csv;</a:t>
             </a:r>
           </a:p>
           <a:p>
@@ -9967,6 +9440,10 @@
               </a:rPr>
               <a:t>run;</a:t>
             </a:r>
+            <a:endParaRPr lang="en-US" sz="4000" dirty="0">
+              <a:latin typeface="Courier New" panose="02070309020205020404" pitchFamily="49" charset="0"/>
+              <a:cs typeface="Courier New" panose="02070309020205020404" pitchFamily="49" charset="0"/>
+            </a:endParaRPr>
           </a:p>
         </p:txBody>
       </p:sp>
@@ -9978,8 +9455,8 @@
         </p:nvSpPr>
         <p:spPr>
           <a:xfrm>
-            <a:off x="6391621" y="2193439"/>
-            <a:ext cx="5722917" cy="1761481"/>
+            <a:off x="402831" y="3371500"/>
+            <a:ext cx="7315200" cy="2286000"/>
           </a:xfrm>
           <a:prstGeom prst="roundRect">
             <a:avLst/>
@@ -10010,89 +9487,94 @@
           <a:lstStyle/>
           <a:p>
             <a:r>
-              <a:rPr lang="en-US" sz="4400" b="1" dirty="0"/>
+              <a:rPr lang="en-US" sz="4800" b="1" dirty="0"/>
               <a:t>R</a:t>
             </a:r>
+            <a:endParaRPr lang="en-US" sz="4800" dirty="0">
+              <a:latin typeface="+mj-lt"/>
+            </a:endParaRPr>
           </a:p>
           <a:p>
             <a:r>
               <a:rPr lang="en-US" sz="2400" dirty="0">
-                <a:solidFill>
-                  <a:srgbClr val="0070C0"/>
-                </a:solidFill>
                 <a:latin typeface="Courier New" panose="02070309020205020404" pitchFamily="49" charset="0"/>
                 <a:cs typeface="Courier New" panose="02070309020205020404" pitchFamily="49" charset="0"/>
               </a:rPr>
-              <a:t>dim(abalone)</a:t>
-            </a:r>
-            <a:endParaRPr lang="en-US" sz="2400" dirty="0">
-              <a:latin typeface="Courier New" panose="02070309020205020404" pitchFamily="49" charset="0"/>
-              <a:cs typeface="Courier New" panose="02070309020205020404" pitchFamily="49" charset="0"/>
-            </a:endParaRPr>
-          </a:p>
-          <a:p>
-            <a:r>
-              <a:rPr lang="en-US" sz="2400" dirty="0">
-                <a:solidFill>
-                  <a:srgbClr val="0070C0"/>
-                </a:solidFill>
+              <a:t>library(</a:t>
+            </a:r>
+            <a:r>
+              <a:rPr lang="en-US" sz="2400" dirty="0" err="1">
                 <a:latin typeface="Courier New" panose="02070309020205020404" pitchFamily="49" charset="0"/>
                 <a:cs typeface="Courier New" panose="02070309020205020404" pitchFamily="49" charset="0"/>
               </a:rPr>
-              <a:t>names(abalone)</a:t>
-            </a:r>
-          </a:p>
-        </p:txBody>
-      </p:sp>
-      <p:cxnSp>
-        <p:nvCxnSpPr>
-          <p:cNvPr id="12" name="Straight Arrow Connector 11"/>
-          <p:cNvCxnSpPr>
-            <a:stCxn id="2" idx="3"/>
-            <a:endCxn id="3" idx="1"/>
-          </p:cNvCxnSpPr>
-          <p:nvPr/>
-        </p:nvCxnSpPr>
-        <p:spPr>
-          <a:xfrm>
-            <a:off x="5800380" y="3074180"/>
-            <a:ext cx="591241" cy="0"/>
-          </a:xfrm>
-          <a:prstGeom prst="straightConnector1">
-            <a:avLst/>
-          </a:prstGeom>
-          <a:ln w="76200">
-            <a:solidFill>
-              <a:srgbClr val="7030A0"/>
-            </a:solidFill>
-            <a:tailEnd type="triangle"/>
-          </a:ln>
-        </p:spPr>
-        <p:style>
-          <a:lnRef idx="1">
-            <a:schemeClr val="accent1"/>
-          </a:lnRef>
-          <a:fillRef idx="0">
-            <a:schemeClr val="accent1"/>
-          </a:fillRef>
-          <a:effectRef idx="0">
-            <a:schemeClr val="accent1"/>
-          </a:effectRef>
-          <a:fontRef idx="minor">
-            <a:schemeClr val="tx1"/>
-          </a:fontRef>
-        </p:style>
-      </p:cxnSp>
-      <p:sp>
-        <p:nvSpPr>
-          <p:cNvPr id="6" name="Rounded Rectangle 5"/>
+              <a:t>readr</a:t>
+            </a:r>
+            <a:r>
+              <a:rPr lang="en-US" sz="2400" dirty="0">
+                <a:latin typeface="Courier New" panose="02070309020205020404" pitchFamily="49" charset="0"/>
+                <a:cs typeface="Courier New" panose="02070309020205020404" pitchFamily="49" charset="0"/>
+              </a:rPr>
+              <a:t>)</a:t>
+            </a:r>
+          </a:p>
+          <a:p>
+            <a:r>
+              <a:rPr lang="en-US" sz="2400" dirty="0">
+                <a:latin typeface="Courier New" panose="02070309020205020404" pitchFamily="49" charset="0"/>
+                <a:cs typeface="Courier New" panose="02070309020205020404" pitchFamily="49" charset="0"/>
+              </a:rPr>
+              <a:t>abalone &lt;-</a:t>
+            </a:r>
+          </a:p>
+          <a:p>
+            <a:r>
+              <a:rPr lang="en-US" sz="2400" dirty="0">
+                <a:latin typeface="Courier New" panose="02070309020205020404" pitchFamily="49" charset="0"/>
+                <a:cs typeface="Courier New" panose="02070309020205020404" pitchFamily="49" charset="0"/>
+              </a:rPr>
+              <a:t>  </a:t>
+            </a:r>
+            <a:r>
+              <a:rPr lang="en-US" sz="2400" dirty="0" err="1">
+                <a:latin typeface="Courier New" panose="02070309020205020404" pitchFamily="49" charset="0"/>
+                <a:cs typeface="Courier New" panose="02070309020205020404" pitchFamily="49" charset="0"/>
+              </a:rPr>
+              <a:t>readr</a:t>
+            </a:r>
+            <a:r>
+              <a:rPr lang="en-US" sz="2400" dirty="0">
+                <a:latin typeface="Courier New" panose="02070309020205020404" pitchFamily="49" charset="0"/>
+                <a:cs typeface="Courier New" panose="02070309020205020404" pitchFamily="49" charset="0"/>
+              </a:rPr>
+              <a:t>::</a:t>
+            </a:r>
+            <a:r>
+              <a:rPr lang="en-US" sz="2400" dirty="0" err="1">
+                <a:latin typeface="Courier New" panose="02070309020205020404" pitchFamily="49" charset="0"/>
+                <a:cs typeface="Courier New" panose="02070309020205020404" pitchFamily="49" charset="0"/>
+              </a:rPr>
+              <a:t>read_csv</a:t>
+            </a:r>
+            <a:r>
+              <a:rPr lang="en-US" sz="2400" dirty="0">
+                <a:latin typeface="Courier New" panose="02070309020205020404" pitchFamily="49" charset="0"/>
+                <a:cs typeface="Courier New" panose="02070309020205020404" pitchFamily="49" charset="0"/>
+              </a:rPr>
+              <a:t>("abalone.csv")</a:t>
+            </a:r>
+          </a:p>
+        </p:txBody>
+      </p:sp>
+      <p:sp>
+        <p:nvSpPr>
+          <p:cNvPr id="12" name="Rounded Rectangle 11"/>
           <p:cNvSpPr/>
           <p:nvPr/>
         </p:nvSpPr>
         <p:spPr>
           <a:xfrm>
-            <a:off x="2760029" y="2961983"/>
-            <a:ext cx="2260756" cy="426346"/>
+            <a:off x="920010" y="1761483"/>
+            <a:ext cx="2120510" cy="426346"/>
           </a:xfrm>
           <a:prstGeom prst="roundRect">
             <a:avLst/>
@@ -10135,14 +9617,14 @@
       </p:sp>
       <p:sp>
         <p:nvSpPr>
-          <p:cNvPr id="7" name="Rounded Rectangle 6"/>
+          <p:cNvPr id="14" name="Rounded Rectangle 13"/>
           <p:cNvSpPr/>
           <p:nvPr/>
         </p:nvSpPr>
         <p:spPr>
           <a:xfrm>
-            <a:off x="7276865" y="2961983"/>
-            <a:ext cx="1311761" cy="426346"/>
+            <a:off x="556307" y="4629034"/>
+            <a:ext cx="1407129" cy="426346"/>
           </a:xfrm>
           <a:prstGeom prst="roundRect">
             <a:avLst/>
@@ -10183,28 +9665,102 @@
           </a:p>
         </p:txBody>
       </p:sp>
-      <p:sp>
-        <p:nvSpPr>
-          <p:cNvPr id="10" name="Rounded Rectangle 9"/>
+      <p:pic>
+        <p:nvPicPr>
+          <p:cNvPr id="10" name="Picture 9"/>
+          <p:cNvPicPr>
+            <a:picLocks noChangeAspect="1"/>
+          </p:cNvPicPr>
+          <p:nvPr/>
+        </p:nvPicPr>
+        <p:blipFill>
+          <a:blip r:embed="rId3">
+            <a:extLst>
+              <a:ext uri="{28A0092B-C50C-407E-A947-70E740481C1C}">
+                <a14:useLocalDpi xmlns:a14="http://schemas.microsoft.com/office/drawing/2010/main" val="0"/>
+              </a:ext>
+            </a:extLst>
+          </a:blip>
+          <a:stretch>
+            <a:fillRect/>
+          </a:stretch>
+        </p:blipFill>
+        <p:spPr>
+          <a:xfrm>
+            <a:off x="9199017" y="906968"/>
+            <a:ext cx="1450193" cy="1493055"/>
+          </a:xfrm>
+          <a:prstGeom prst="rect">
+            <a:avLst/>
+          </a:prstGeom>
+        </p:spPr>
+      </p:pic>
+      <p:sp>
+        <p:nvSpPr>
+          <p:cNvPr id="11" name="TextBox 10"/>
+          <p:cNvSpPr txBox="1"/>
+          <p:nvPr/>
+        </p:nvSpPr>
+        <p:spPr>
+          <a:xfrm>
+            <a:off x="8633535" y="4099002"/>
+            <a:ext cx="2581156" cy="830997"/>
+          </a:xfrm>
+          <a:prstGeom prst="rect">
+            <a:avLst/>
+          </a:prstGeom>
+          <a:noFill/>
+        </p:spPr>
+        <p:txBody>
+          <a:bodyPr wrap="none" rtlCol="0">
+            <a:spAutoFit/>
+          </a:bodyPr>
+          <a:lstStyle/>
+          <a:p>
+            <a:r>
+              <a:rPr lang="en-US" sz="2400" b="1" dirty="0">
+                <a:solidFill>
+                  <a:srgbClr val="0070C0"/>
+                </a:solidFill>
+                <a:latin typeface="Courier New" panose="02070309020205020404" pitchFamily="49" charset="0"/>
+                <a:cs typeface="Courier New" panose="02070309020205020404" pitchFamily="49" charset="0"/>
+              </a:rPr>
+              <a:t>&gt; ls()</a:t>
+            </a:r>
+          </a:p>
+          <a:p>
+            <a:r>
+              <a:rPr lang="en-US" sz="2400" b="1" dirty="0">
+                <a:latin typeface="Courier New" panose="02070309020205020404" pitchFamily="49" charset="0"/>
+                <a:cs typeface="Courier New" panose="02070309020205020404" pitchFamily="49" charset="0"/>
+              </a:rPr>
+              <a:t>[1] "abalone"</a:t>
+            </a:r>
+          </a:p>
+        </p:txBody>
+      </p:sp>
+      <p:sp>
+        <p:nvSpPr>
+          <p:cNvPr id="13" name="Right Arrow 12"/>
           <p:cNvSpPr/>
           <p:nvPr/>
         </p:nvSpPr>
         <p:spPr>
           <a:xfrm>
-            <a:off x="7653658" y="3338775"/>
-            <a:ext cx="1311761" cy="426346"/>
-          </a:xfrm>
-          <a:prstGeom prst="roundRect">
+            <a:off x="7124467" y="1412273"/>
+            <a:ext cx="1929776" cy="482444"/>
+          </a:xfrm>
+          <a:prstGeom prst="rightArrow">
             <a:avLst/>
           </a:prstGeom>
           <a:solidFill>
             <a:srgbClr val="7030A0">
-              <a:alpha val="30196"/>
+              <a:alpha val="80000"/>
             </a:srgbClr>
           </a:solidFill>
           <a:ln>
             <a:solidFill>
-              <a:srgbClr val="00B050"/>
+              <a:schemeClr val="tx1"/>
             </a:solidFill>
           </a:ln>
         </p:spPr>
@@ -10233,10 +9789,122 @@
           </a:p>
         </p:txBody>
       </p:sp>
+      <p:sp>
+        <p:nvSpPr>
+          <p:cNvPr id="15" name="Right Arrow 14"/>
+          <p:cNvSpPr/>
+          <p:nvPr/>
+        </p:nvSpPr>
+        <p:spPr>
+          <a:xfrm>
+            <a:off x="6570030" y="4273278"/>
+            <a:ext cx="1929776" cy="482444"/>
+          </a:xfrm>
+          <a:prstGeom prst="rightArrow">
+            <a:avLst/>
+          </a:prstGeom>
+          <a:solidFill>
+            <a:srgbClr val="7030A0">
+              <a:alpha val="80000"/>
+            </a:srgbClr>
+          </a:solidFill>
+          <a:ln>
+            <a:solidFill>
+              <a:schemeClr val="tx1"/>
+            </a:solidFill>
+          </a:ln>
+        </p:spPr>
+        <p:style>
+          <a:lnRef idx="2">
+            <a:schemeClr val="accent1">
+              <a:shade val="50000"/>
+            </a:schemeClr>
+          </a:lnRef>
+          <a:fillRef idx="1">
+            <a:schemeClr val="accent1"/>
+          </a:fillRef>
+          <a:effectRef idx="0">
+            <a:schemeClr val="accent1"/>
+          </a:effectRef>
+          <a:fontRef idx="minor">
+            <a:schemeClr val="lt1"/>
+          </a:fontRef>
+        </p:style>
+        <p:txBody>
+          <a:bodyPr rtlCol="0" anchor="ctr"/>
+          <a:lstStyle/>
+          <a:p>
+            <a:pPr algn="ctr"/>
+            <a:endParaRPr lang="en-US"/>
+          </a:p>
+        </p:txBody>
+      </p:sp>
+      <p:sp>
+        <p:nvSpPr>
+          <p:cNvPr id="16" name="TextBox 15"/>
+          <p:cNvSpPr txBox="1"/>
+          <p:nvPr/>
+        </p:nvSpPr>
+        <p:spPr>
+          <a:xfrm>
+            <a:off x="8695475" y="322193"/>
+            <a:ext cx="2457276" cy="584775"/>
+          </a:xfrm>
+          <a:prstGeom prst="rect">
+            <a:avLst/>
+          </a:prstGeom>
+          <a:noFill/>
+        </p:spPr>
+        <p:txBody>
+          <a:bodyPr wrap="none" rtlCol="0">
+            <a:spAutoFit/>
+          </a:bodyPr>
+          <a:lstStyle/>
+          <a:p>
+            <a:r>
+              <a:rPr lang="en-US" sz="3200" dirty="0">
+                <a:latin typeface="+mj-lt"/>
+              </a:rPr>
+              <a:t>WORK Library</a:t>
+            </a:r>
+          </a:p>
+        </p:txBody>
+      </p:sp>
+      <p:sp>
+        <p:nvSpPr>
+          <p:cNvPr id="17" name="TextBox 16"/>
+          <p:cNvSpPr txBox="1"/>
+          <p:nvPr/>
+        </p:nvSpPr>
+        <p:spPr>
+          <a:xfrm>
+            <a:off x="8197422" y="3371500"/>
+            <a:ext cx="3453381" cy="584775"/>
+          </a:xfrm>
+          <a:prstGeom prst="rect">
+            <a:avLst/>
+          </a:prstGeom>
+          <a:noFill/>
+        </p:spPr>
+        <p:txBody>
+          <a:bodyPr wrap="none" rtlCol="0">
+            <a:spAutoFit/>
+          </a:bodyPr>
+          <a:lstStyle/>
+          <a:p>
+            <a:r>
+              <a:rPr lang="en-US" sz="3200" dirty="0">
+                <a:latin typeface="+mj-lt"/>
+              </a:rPr>
+              <a:t>Global Environment</a:t>
+            </a:r>
+          </a:p>
+        </p:txBody>
+      </p:sp>
     </p:spTree>
     <p:extLst>
       <p:ext uri="{BB962C8B-B14F-4D97-AF65-F5344CB8AC3E}">
-        <p14:creationId xmlns:p14="http://schemas.microsoft.com/office/powerpoint/2010/main" val="3979035476"/>
+        <p14:creationId xmlns:p14="http://schemas.microsoft.com/office/powerpoint/2010/main" val="361446460"/>
       </p:ext>
     </p:extLst>
   </p:cSld>
@@ -10271,8 +9939,79 @@
         </p:nvSpPr>
         <p:spPr>
           <a:xfrm>
-            <a:off x="3395980" y="903183"/>
-            <a:ext cx="5852160" cy="2926080"/>
+            <a:off x="77463" y="2193439"/>
+            <a:ext cx="5722917" cy="1761481"/>
+          </a:xfrm>
+          <a:prstGeom prst="roundRect">
+            <a:avLst/>
+          </a:prstGeom>
+          <a:solidFill>
+            <a:schemeClr val="accent1">
+              <a:lumMod val="20000"/>
+              <a:lumOff val="80000"/>
+            </a:schemeClr>
+          </a:solidFill>
+        </p:spPr>
+        <p:style>
+          <a:lnRef idx="1">
+            <a:schemeClr val="accent1"/>
+          </a:lnRef>
+          <a:fillRef idx="2">
+            <a:schemeClr val="accent1"/>
+          </a:fillRef>
+          <a:effectRef idx="1">
+            <a:schemeClr val="accent1"/>
+          </a:effectRef>
+          <a:fontRef idx="minor">
+            <a:schemeClr val="dk1"/>
+          </a:fontRef>
+        </p:style>
+        <p:txBody>
+          <a:bodyPr rtlCol="0" anchor="t"/>
+          <a:lstStyle/>
+          <a:p>
+            <a:r>
+              <a:rPr lang="en-US" sz="4400" b="1" dirty="0"/>
+              <a:t>SAS</a:t>
+            </a:r>
+          </a:p>
+          <a:p>
+            <a:r>
+              <a:rPr lang="en-US" sz="2400" dirty="0" err="1">
+                <a:latin typeface="Courier New" panose="02070309020205020404" pitchFamily="49" charset="0"/>
+                <a:cs typeface="Courier New" panose="02070309020205020404" pitchFamily="49" charset="0"/>
+              </a:rPr>
+              <a:t>proc</a:t>
+            </a:r>
+            <a:r>
+              <a:rPr lang="en-US" sz="2400" dirty="0">
+                <a:latin typeface="Courier New" panose="02070309020205020404" pitchFamily="49" charset="0"/>
+                <a:cs typeface="Courier New" panose="02070309020205020404" pitchFamily="49" charset="0"/>
+              </a:rPr>
+              <a:t> contents data=abalone;</a:t>
+            </a:r>
+          </a:p>
+          <a:p>
+            <a:r>
+              <a:rPr lang="en-US" sz="2400" dirty="0">
+                <a:latin typeface="Courier New" panose="02070309020205020404" pitchFamily="49" charset="0"/>
+                <a:cs typeface="Courier New" panose="02070309020205020404" pitchFamily="49" charset="0"/>
+              </a:rPr>
+              <a:t>run;</a:t>
+            </a:r>
+          </a:p>
+        </p:txBody>
+      </p:sp>
+      <p:sp>
+        <p:nvSpPr>
+          <p:cNvPr id="3" name="Rounded Rectangle 2"/>
+          <p:cNvSpPr/>
+          <p:nvPr/>
+        </p:nvSpPr>
+        <p:spPr>
+          <a:xfrm>
+            <a:off x="6391621" y="2193439"/>
+            <a:ext cx="5722917" cy="1761481"/>
           </a:xfrm>
           <a:prstGeom prst="roundRect">
             <a:avLst/>
@@ -10316,23 +10055,9 @@
                 <a:latin typeface="Courier New" panose="02070309020205020404" pitchFamily="49" charset="0"/>
                 <a:cs typeface="Courier New" panose="02070309020205020404" pitchFamily="49" charset="0"/>
               </a:rPr>
-              <a:t>arrange(abalone, diameter)</a:t>
-            </a:r>
-          </a:p>
-          <a:p>
+              <a:t>dim(abalone)</a:t>
+            </a:r>
             <a:endParaRPr lang="en-US" sz="2400" dirty="0">
-              <a:solidFill>
-                <a:srgbClr val="0070C0"/>
-              </a:solidFill>
-              <a:latin typeface="Courier New" panose="02070309020205020404" pitchFamily="49" charset="0"/>
-              <a:cs typeface="Courier New" panose="02070309020205020404" pitchFamily="49" charset="0"/>
-            </a:endParaRPr>
-          </a:p>
-          <a:p>
-            <a:endParaRPr lang="en-US" sz="2400" dirty="0">
-              <a:solidFill>
-                <a:srgbClr val="0070C0"/>
-              </a:solidFill>
               <a:latin typeface="Courier New" panose="02070309020205020404" pitchFamily="49" charset="0"/>
               <a:cs typeface="Courier New" panose="02070309020205020404" pitchFamily="49" charset="0"/>
             </a:endParaRPr>
@@ -10346,15 +10071,204 @@
                 <a:latin typeface="Courier New" panose="02070309020205020404" pitchFamily="49" charset="0"/>
                 <a:cs typeface="Courier New" panose="02070309020205020404" pitchFamily="49" charset="0"/>
               </a:rPr>
-              <a:t>abalone %&gt;% arrange(diameter)</a:t>
-            </a:r>
+              <a:t>names(abalone)</a:t>
+            </a:r>
+          </a:p>
+        </p:txBody>
+      </p:sp>
+      <p:cxnSp>
+        <p:nvCxnSpPr>
+          <p:cNvPr id="12" name="Straight Arrow Connector 11"/>
+          <p:cNvCxnSpPr>
+            <a:stCxn id="2" idx="3"/>
+            <a:endCxn id="3" idx="1"/>
+          </p:cNvCxnSpPr>
+          <p:nvPr/>
+        </p:nvCxnSpPr>
+        <p:spPr>
+          <a:xfrm>
+            <a:off x="5800380" y="3074180"/>
+            <a:ext cx="591241" cy="0"/>
+          </a:xfrm>
+          <a:prstGeom prst="straightConnector1">
+            <a:avLst/>
+          </a:prstGeom>
+          <a:ln w="76200">
+            <a:solidFill>
+              <a:srgbClr val="7030A0"/>
+            </a:solidFill>
+            <a:tailEnd type="triangle"/>
+          </a:ln>
+        </p:spPr>
+        <p:style>
+          <a:lnRef idx="1">
+            <a:schemeClr val="accent1"/>
+          </a:lnRef>
+          <a:fillRef idx="0">
+            <a:schemeClr val="accent1"/>
+          </a:fillRef>
+          <a:effectRef idx="0">
+            <a:schemeClr val="accent1"/>
+          </a:effectRef>
+          <a:fontRef idx="minor">
+            <a:schemeClr val="tx1"/>
+          </a:fontRef>
+        </p:style>
+      </p:cxnSp>
+      <p:sp>
+        <p:nvSpPr>
+          <p:cNvPr id="6" name="Rounded Rectangle 5"/>
+          <p:cNvSpPr/>
+          <p:nvPr/>
+        </p:nvSpPr>
+        <p:spPr>
+          <a:xfrm>
+            <a:off x="2760029" y="2961983"/>
+            <a:ext cx="2260756" cy="426346"/>
+          </a:xfrm>
+          <a:prstGeom prst="roundRect">
+            <a:avLst/>
+          </a:prstGeom>
+          <a:solidFill>
+            <a:srgbClr val="7030A0">
+              <a:alpha val="30196"/>
+            </a:srgbClr>
+          </a:solidFill>
+          <a:ln>
+            <a:solidFill>
+              <a:srgbClr val="00B050"/>
+            </a:solidFill>
+          </a:ln>
+        </p:spPr>
+        <p:style>
+          <a:lnRef idx="2">
+            <a:schemeClr val="accent1">
+              <a:shade val="50000"/>
+            </a:schemeClr>
+          </a:lnRef>
+          <a:fillRef idx="1">
+            <a:schemeClr val="accent1"/>
+          </a:fillRef>
+          <a:effectRef idx="0">
+            <a:schemeClr val="accent1"/>
+          </a:effectRef>
+          <a:fontRef idx="minor">
+            <a:schemeClr val="lt1"/>
+          </a:fontRef>
+        </p:style>
+        <p:txBody>
+          <a:bodyPr rtlCol="0" anchor="ctr"/>
+          <a:lstStyle/>
+          <a:p>
+            <a:pPr algn="ctr"/>
+            <a:endParaRPr lang="en-US"/>
+          </a:p>
+        </p:txBody>
+      </p:sp>
+      <p:sp>
+        <p:nvSpPr>
+          <p:cNvPr id="7" name="Rounded Rectangle 6"/>
+          <p:cNvSpPr/>
+          <p:nvPr/>
+        </p:nvSpPr>
+        <p:spPr>
+          <a:xfrm>
+            <a:off x="7276865" y="2961983"/>
+            <a:ext cx="1311761" cy="426346"/>
+          </a:xfrm>
+          <a:prstGeom prst="roundRect">
+            <a:avLst/>
+          </a:prstGeom>
+          <a:solidFill>
+            <a:srgbClr val="7030A0">
+              <a:alpha val="30196"/>
+            </a:srgbClr>
+          </a:solidFill>
+          <a:ln>
+            <a:solidFill>
+              <a:srgbClr val="00B050"/>
+            </a:solidFill>
+          </a:ln>
+        </p:spPr>
+        <p:style>
+          <a:lnRef idx="2">
+            <a:schemeClr val="accent1">
+              <a:shade val="50000"/>
+            </a:schemeClr>
+          </a:lnRef>
+          <a:fillRef idx="1">
+            <a:schemeClr val="accent1"/>
+          </a:fillRef>
+          <a:effectRef idx="0">
+            <a:schemeClr val="accent1"/>
+          </a:effectRef>
+          <a:fontRef idx="minor">
+            <a:schemeClr val="lt1"/>
+          </a:fontRef>
+        </p:style>
+        <p:txBody>
+          <a:bodyPr rtlCol="0" anchor="ctr"/>
+          <a:lstStyle/>
+          <a:p>
+            <a:pPr algn="ctr"/>
+            <a:endParaRPr lang="en-US"/>
+          </a:p>
+        </p:txBody>
+      </p:sp>
+      <p:sp>
+        <p:nvSpPr>
+          <p:cNvPr id="10" name="Rounded Rectangle 9"/>
+          <p:cNvSpPr/>
+          <p:nvPr/>
+        </p:nvSpPr>
+        <p:spPr>
+          <a:xfrm>
+            <a:off x="7653658" y="3338775"/>
+            <a:ext cx="1311761" cy="426346"/>
+          </a:xfrm>
+          <a:prstGeom prst="roundRect">
+            <a:avLst/>
+          </a:prstGeom>
+          <a:solidFill>
+            <a:srgbClr val="7030A0">
+              <a:alpha val="30196"/>
+            </a:srgbClr>
+          </a:solidFill>
+          <a:ln>
+            <a:solidFill>
+              <a:srgbClr val="00B050"/>
+            </a:solidFill>
+          </a:ln>
+        </p:spPr>
+        <p:style>
+          <a:lnRef idx="2">
+            <a:schemeClr val="accent1">
+              <a:shade val="50000"/>
+            </a:schemeClr>
+          </a:lnRef>
+          <a:fillRef idx="1">
+            <a:schemeClr val="accent1"/>
+          </a:fillRef>
+          <a:effectRef idx="0">
+            <a:schemeClr val="accent1"/>
+          </a:effectRef>
+          <a:fontRef idx="minor">
+            <a:schemeClr val="lt1"/>
+          </a:fontRef>
+        </p:style>
+        <p:txBody>
+          <a:bodyPr rtlCol="0" anchor="ctr"/>
+          <a:lstStyle/>
+          <a:p>
+            <a:pPr algn="ctr"/>
+            <a:endParaRPr lang="en-US"/>
           </a:p>
         </p:txBody>
       </p:sp>
     </p:spTree>
     <p:extLst>
       <p:ext uri="{BB962C8B-B14F-4D97-AF65-F5344CB8AC3E}">
-        <p14:creationId xmlns:p14="http://schemas.microsoft.com/office/powerpoint/2010/main" val="1832471232"/>
+        <p14:creationId xmlns:p14="http://schemas.microsoft.com/office/powerpoint/2010/main" val="3979035476"/>
       </p:ext>
     </p:extLst>
   </p:cSld>
@@ -10389,8 +10303,79 @@
         </p:nvSpPr>
         <p:spPr>
           <a:xfrm>
-            <a:off x="3395980" y="903183"/>
-            <a:ext cx="5852160" cy="2926080"/>
+            <a:off x="77463" y="2193439"/>
+            <a:ext cx="5722917" cy="1761481"/>
+          </a:xfrm>
+          <a:prstGeom prst="roundRect">
+            <a:avLst/>
+          </a:prstGeom>
+          <a:solidFill>
+            <a:schemeClr val="accent1">
+              <a:lumMod val="20000"/>
+              <a:lumOff val="80000"/>
+            </a:schemeClr>
+          </a:solidFill>
+        </p:spPr>
+        <p:style>
+          <a:lnRef idx="1">
+            <a:schemeClr val="accent1"/>
+          </a:lnRef>
+          <a:fillRef idx="2">
+            <a:schemeClr val="accent1"/>
+          </a:fillRef>
+          <a:effectRef idx="1">
+            <a:schemeClr val="accent1"/>
+          </a:effectRef>
+          <a:fontRef idx="minor">
+            <a:schemeClr val="dk1"/>
+          </a:fontRef>
+        </p:style>
+        <p:txBody>
+          <a:bodyPr rtlCol="0" anchor="t"/>
+          <a:lstStyle/>
+          <a:p>
+            <a:r>
+              <a:rPr lang="en-US" sz="4400" b="1" dirty="0"/>
+              <a:t>SAS</a:t>
+            </a:r>
+          </a:p>
+          <a:p>
+            <a:r>
+              <a:rPr lang="en-US" sz="2400" dirty="0" err="1">
+                <a:latin typeface="Courier New" panose="02070309020205020404" pitchFamily="49" charset="0"/>
+                <a:cs typeface="Courier New" panose="02070309020205020404" pitchFamily="49" charset="0"/>
+              </a:rPr>
+              <a:t>proc</a:t>
+            </a:r>
+            <a:r>
+              <a:rPr lang="en-US" sz="2400" dirty="0">
+                <a:latin typeface="Courier New" panose="02070309020205020404" pitchFamily="49" charset="0"/>
+                <a:cs typeface="Courier New" panose="02070309020205020404" pitchFamily="49" charset="0"/>
+              </a:rPr>
+              <a:t> contents data=abalone;</a:t>
+            </a:r>
+          </a:p>
+          <a:p>
+            <a:r>
+              <a:rPr lang="en-US" sz="2400" dirty="0">
+                <a:latin typeface="Courier New" panose="02070309020205020404" pitchFamily="49" charset="0"/>
+                <a:cs typeface="Courier New" panose="02070309020205020404" pitchFamily="49" charset="0"/>
+              </a:rPr>
+              <a:t>run;</a:t>
+            </a:r>
+          </a:p>
+        </p:txBody>
+      </p:sp>
+      <p:sp>
+        <p:nvSpPr>
+          <p:cNvPr id="3" name="Rounded Rectangle 2"/>
+          <p:cNvSpPr/>
+          <p:nvPr/>
+        </p:nvSpPr>
+        <p:spPr>
+          <a:xfrm>
+            <a:off x="6391621" y="2193439"/>
+            <a:ext cx="5722917" cy="1761481"/>
           </a:xfrm>
           <a:prstGeom prst="roundRect">
             <a:avLst/>
@@ -10427,6 +10412,16 @@
           </a:p>
           <a:p>
             <a:r>
+              <a:rPr lang="en-US" sz="2400" dirty="0" err="1">
+                <a:solidFill>
+                  <a:srgbClr val="0070C0"/>
+                </a:solidFill>
+                <a:latin typeface="Courier New" panose="02070309020205020404" pitchFamily="49" charset="0"/>
+                <a:cs typeface="Courier New" panose="02070309020205020404" pitchFamily="49" charset="0"/>
+              </a:rPr>
+              <a:t>str</a:t>
+            </a:r>
+            <a:r>
               <a:rPr lang="en-US" sz="2400" dirty="0">
                 <a:solidFill>
                   <a:srgbClr val="0070C0"/>
@@ -10434,8 +10429,12 @@
                 <a:latin typeface="Courier New" panose="02070309020205020404" pitchFamily="49" charset="0"/>
                 <a:cs typeface="Courier New" panose="02070309020205020404" pitchFamily="49" charset="0"/>
               </a:rPr>
-              <a:t>arrange(abalone, diameter)</a:t>
-            </a:r>
+              <a:t>(abalone)</a:t>
+            </a:r>
+            <a:endParaRPr lang="en-US" sz="2400" dirty="0">
+              <a:latin typeface="Courier New" panose="02070309020205020404" pitchFamily="49" charset="0"/>
+              <a:cs typeface="Courier New" panose="02070309020205020404" pitchFamily="49" charset="0"/>
+            </a:endParaRPr>
           </a:p>
           <a:p>
             <a:endParaRPr lang="en-US" sz="2400" dirty="0">
@@ -10446,39 +10445,57 @@
               <a:cs typeface="Courier New" panose="02070309020205020404" pitchFamily="49" charset="0"/>
             </a:endParaRPr>
           </a:p>
-          <a:p>
-            <a:endParaRPr lang="en-US" sz="2400" dirty="0">
-              <a:solidFill>
-                <a:srgbClr val="0070C0"/>
-              </a:solidFill>
-              <a:latin typeface="Courier New" panose="02070309020205020404" pitchFamily="49" charset="0"/>
-              <a:cs typeface="Courier New" panose="02070309020205020404" pitchFamily="49" charset="0"/>
-            </a:endParaRPr>
-          </a:p>
-          <a:p>
-            <a:r>
-              <a:rPr lang="en-US" sz="2400" dirty="0">
-                <a:solidFill>
-                  <a:srgbClr val="0070C0"/>
-                </a:solidFill>
-                <a:latin typeface="Courier New" panose="02070309020205020404" pitchFamily="49" charset="0"/>
-                <a:cs typeface="Courier New" panose="02070309020205020404" pitchFamily="49" charset="0"/>
-              </a:rPr>
-              <a:t>abalone %&gt;% arrange(diameter)</a:t>
-            </a:r>
-          </a:p>
-        </p:txBody>
-      </p:sp>
-      <p:sp>
-        <p:nvSpPr>
-          <p:cNvPr id="3" name="Rounded Rectangle 2"/>
+        </p:txBody>
+      </p:sp>
+      <p:cxnSp>
+        <p:nvCxnSpPr>
+          <p:cNvPr id="12" name="Straight Arrow Connector 11"/>
+          <p:cNvCxnSpPr>
+            <a:stCxn id="2" idx="3"/>
+            <a:endCxn id="3" idx="1"/>
+          </p:cNvCxnSpPr>
+          <p:nvPr/>
+        </p:nvCxnSpPr>
+        <p:spPr>
+          <a:xfrm>
+            <a:off x="5800380" y="3074180"/>
+            <a:ext cx="591241" cy="0"/>
+          </a:xfrm>
+          <a:prstGeom prst="straightConnector1">
+            <a:avLst/>
+          </a:prstGeom>
+          <a:ln w="76200">
+            <a:solidFill>
+              <a:srgbClr val="7030A0"/>
+            </a:solidFill>
+            <a:tailEnd type="triangle"/>
+          </a:ln>
+        </p:spPr>
+        <p:style>
+          <a:lnRef idx="1">
+            <a:schemeClr val="accent1"/>
+          </a:lnRef>
+          <a:fillRef idx="0">
+            <a:schemeClr val="accent1"/>
+          </a:fillRef>
+          <a:effectRef idx="0">
+            <a:schemeClr val="accent1"/>
+          </a:effectRef>
+          <a:fontRef idx="minor">
+            <a:schemeClr val="tx1"/>
+          </a:fontRef>
+        </p:style>
+      </p:cxnSp>
+      <p:sp>
+        <p:nvSpPr>
+          <p:cNvPr id="6" name="Rounded Rectangle 5"/>
           <p:cNvSpPr/>
           <p:nvPr/>
         </p:nvSpPr>
         <p:spPr>
           <a:xfrm>
-            <a:off x="5060054" y="1705385"/>
-            <a:ext cx="1301477" cy="426346"/>
+            <a:off x="2760029" y="2961983"/>
+            <a:ext cx="2260756" cy="426346"/>
           </a:xfrm>
           <a:prstGeom prst="roundRect">
             <a:avLst/>
@@ -10521,14 +10538,14 @@
       </p:sp>
       <p:sp>
         <p:nvSpPr>
-          <p:cNvPr id="4" name="Rounded Rectangle 3"/>
+          <p:cNvPr id="7" name="Rounded Rectangle 6"/>
           <p:cNvSpPr/>
           <p:nvPr/>
         </p:nvSpPr>
         <p:spPr>
           <a:xfrm>
-            <a:off x="3608046" y="2822673"/>
-            <a:ext cx="1301477" cy="426346"/>
+            <a:off x="7271259" y="2961983"/>
+            <a:ext cx="1311761" cy="426346"/>
           </a:xfrm>
           <a:prstGeom prst="roundRect">
             <a:avLst/>
@@ -10569,49 +10586,10 @@
           </a:p>
         </p:txBody>
       </p:sp>
-      <p:cxnSp>
-        <p:nvCxnSpPr>
-          <p:cNvPr id="6" name="Straight Arrow Connector 5"/>
-          <p:cNvCxnSpPr>
-            <a:stCxn id="3" idx="2"/>
-            <a:endCxn id="4" idx="0"/>
-          </p:cNvCxnSpPr>
-          <p:nvPr/>
-        </p:nvCxnSpPr>
-        <p:spPr>
-          <a:xfrm flipH="1">
-            <a:off x="4258785" y="2131731"/>
-            <a:ext cx="1452008" cy="690942"/>
-          </a:xfrm>
-          <a:prstGeom prst="straightConnector1">
-            <a:avLst/>
-          </a:prstGeom>
-          <a:ln w="57150">
-            <a:solidFill>
-              <a:schemeClr val="tx1"/>
-            </a:solidFill>
-            <a:tailEnd type="triangle"/>
-          </a:ln>
-        </p:spPr>
-        <p:style>
-          <a:lnRef idx="1">
-            <a:schemeClr val="accent1"/>
-          </a:lnRef>
-          <a:fillRef idx="0">
-            <a:schemeClr val="accent1"/>
-          </a:fillRef>
-          <a:effectRef idx="0">
-            <a:schemeClr val="accent1"/>
-          </a:effectRef>
-          <a:fontRef idx="minor">
-            <a:schemeClr val="tx1"/>
-          </a:fontRef>
-        </p:style>
-      </p:cxnSp>
     </p:spTree>
     <p:extLst>
       <p:ext uri="{BB962C8B-B14F-4D97-AF65-F5344CB8AC3E}">
-        <p14:creationId xmlns:p14="http://schemas.microsoft.com/office/powerpoint/2010/main" val="1963359858"/>
+        <p14:creationId xmlns:p14="http://schemas.microsoft.com/office/powerpoint/2010/main" val="762780022"/>
       </p:ext>
     </p:extLst>
   </p:cSld>
@@ -10638,148 +10616,10 @@
           <a:chExt cx="0" cy="0"/>
         </a:xfrm>
       </p:grpSpPr>
-      <p:sp>
-        <p:nvSpPr>
-          <p:cNvPr id="2" name="Rounded Rectangle 1"/>
-          <p:cNvSpPr/>
-          <p:nvPr/>
-        </p:nvSpPr>
-        <p:spPr>
-          <a:xfrm>
-            <a:off x="3395980" y="903183"/>
-            <a:ext cx="5852160" cy="2926080"/>
-          </a:xfrm>
-          <a:prstGeom prst="roundRect">
-            <a:avLst/>
-          </a:prstGeom>
-          <a:solidFill>
-            <a:schemeClr val="accent4">
-              <a:lumMod val="20000"/>
-              <a:lumOff val="80000"/>
-            </a:schemeClr>
-          </a:solidFill>
-        </p:spPr>
-        <p:style>
-          <a:lnRef idx="1">
-            <a:schemeClr val="accent4"/>
-          </a:lnRef>
-          <a:fillRef idx="2">
-            <a:schemeClr val="accent4"/>
-          </a:fillRef>
-          <a:effectRef idx="1">
-            <a:schemeClr val="accent4"/>
-          </a:effectRef>
-          <a:fontRef idx="minor">
-            <a:schemeClr val="dk1"/>
-          </a:fontRef>
-        </p:style>
-        <p:txBody>
-          <a:bodyPr rtlCol="0" anchor="t"/>
-          <a:lstStyle/>
-          <a:p>
-            <a:r>
-              <a:rPr lang="en-US" sz="4400" b="1" dirty="0"/>
-              <a:t>R</a:t>
-            </a:r>
-          </a:p>
-          <a:p>
-            <a:r>
-              <a:rPr lang="en-US" sz="2400" dirty="0">
-                <a:solidFill>
-                  <a:srgbClr val="0070C0"/>
-                </a:solidFill>
-                <a:latin typeface="Courier New" panose="02070309020205020404" pitchFamily="49" charset="0"/>
-                <a:cs typeface="Courier New" panose="02070309020205020404" pitchFamily="49" charset="0"/>
-              </a:rPr>
-              <a:t>arrange(abalone, diameter)</a:t>
-            </a:r>
-          </a:p>
-          <a:p>
-            <a:endParaRPr lang="en-US" sz="2400" dirty="0">
-              <a:solidFill>
-                <a:srgbClr val="0070C0"/>
-              </a:solidFill>
-              <a:latin typeface="Courier New" panose="02070309020205020404" pitchFamily="49" charset="0"/>
-              <a:cs typeface="Courier New" panose="02070309020205020404" pitchFamily="49" charset="0"/>
-            </a:endParaRPr>
-          </a:p>
-          <a:p>
-            <a:endParaRPr lang="en-US" sz="2400" dirty="0">
-              <a:solidFill>
-                <a:srgbClr val="0070C0"/>
-              </a:solidFill>
-              <a:latin typeface="Courier New" panose="02070309020205020404" pitchFamily="49" charset="0"/>
-              <a:cs typeface="Courier New" panose="02070309020205020404" pitchFamily="49" charset="0"/>
-            </a:endParaRPr>
-          </a:p>
-          <a:p>
-            <a:r>
-              <a:rPr lang="en-US" sz="2400" dirty="0">
-                <a:solidFill>
-                  <a:srgbClr val="0070C0"/>
-                </a:solidFill>
-                <a:latin typeface="Courier New" panose="02070309020205020404" pitchFamily="49" charset="0"/>
-                <a:cs typeface="Courier New" panose="02070309020205020404" pitchFamily="49" charset="0"/>
-              </a:rPr>
-              <a:t>abalone %&gt;% arrange(diameter)</a:t>
-            </a:r>
-          </a:p>
-        </p:txBody>
-      </p:sp>
-      <p:sp>
-        <p:nvSpPr>
-          <p:cNvPr id="7" name="Rounded Rectangle 6"/>
-          <p:cNvSpPr/>
-          <p:nvPr/>
-        </p:nvSpPr>
-        <p:spPr>
-          <a:xfrm>
-            <a:off x="4990953" y="2827348"/>
-            <a:ext cx="742279" cy="426346"/>
-          </a:xfrm>
-          <a:prstGeom prst="roundRect">
-            <a:avLst/>
-          </a:prstGeom>
-          <a:solidFill>
-            <a:srgbClr val="7030A0">
-              <a:alpha val="30196"/>
-            </a:srgbClr>
-          </a:solidFill>
-          <a:ln>
-            <a:solidFill>
-              <a:srgbClr val="00B050"/>
-            </a:solidFill>
-          </a:ln>
-        </p:spPr>
-        <p:style>
-          <a:lnRef idx="2">
-            <a:schemeClr val="accent1">
-              <a:shade val="50000"/>
-            </a:schemeClr>
-          </a:lnRef>
-          <a:fillRef idx="1">
-            <a:schemeClr val="accent1"/>
-          </a:fillRef>
-          <a:effectRef idx="0">
-            <a:schemeClr val="accent1"/>
-          </a:effectRef>
-          <a:fontRef idx="minor">
-            <a:schemeClr val="lt1"/>
-          </a:fontRef>
-        </p:style>
-        <p:txBody>
-          <a:bodyPr rtlCol="0" anchor="ctr"/>
-          <a:lstStyle/>
-          <a:p>
-            <a:pPr algn="ctr"/>
-            <a:endParaRPr lang="en-US"/>
-          </a:p>
-        </p:txBody>
-      </p:sp>
     </p:spTree>
     <p:extLst>
       <p:ext uri="{BB962C8B-B14F-4D97-AF65-F5344CB8AC3E}">
-        <p14:creationId xmlns:p14="http://schemas.microsoft.com/office/powerpoint/2010/main" val="2666733228"/>
+        <p14:creationId xmlns:p14="http://schemas.microsoft.com/office/powerpoint/2010/main" val="3401541578"/>
       </p:ext>
     </p:extLst>
   </p:cSld>
@@ -10894,169 +10734,10 @@
           </a:p>
         </p:txBody>
       </p:sp>
-      <p:sp>
-        <p:nvSpPr>
-          <p:cNvPr id="7" name="Rounded Rectangle 6"/>
-          <p:cNvSpPr/>
-          <p:nvPr/>
-        </p:nvSpPr>
-        <p:spPr>
-          <a:xfrm>
-            <a:off x="4990953" y="2827348"/>
-            <a:ext cx="742279" cy="426346"/>
-          </a:xfrm>
-          <a:prstGeom prst="roundRect">
-            <a:avLst/>
-          </a:prstGeom>
-          <a:solidFill>
-            <a:srgbClr val="7030A0">
-              <a:alpha val="30196"/>
-            </a:srgbClr>
-          </a:solidFill>
-          <a:ln>
-            <a:solidFill>
-              <a:srgbClr val="00B050"/>
-            </a:solidFill>
-          </a:ln>
-        </p:spPr>
-        <p:style>
-          <a:lnRef idx="2">
-            <a:schemeClr val="accent1">
-              <a:shade val="50000"/>
-            </a:schemeClr>
-          </a:lnRef>
-          <a:fillRef idx="1">
-            <a:schemeClr val="accent1"/>
-          </a:fillRef>
-          <a:effectRef idx="0">
-            <a:schemeClr val="accent1"/>
-          </a:effectRef>
-          <a:fontRef idx="minor">
-            <a:schemeClr val="lt1"/>
-          </a:fontRef>
-        </p:style>
-        <p:txBody>
-          <a:bodyPr rtlCol="0" anchor="ctr"/>
-          <a:lstStyle/>
-          <a:p>
-            <a:pPr algn="ctr"/>
-            <a:endParaRPr lang="en-US"/>
-          </a:p>
-        </p:txBody>
-      </p:sp>
-      <p:sp>
-        <p:nvSpPr>
-          <p:cNvPr id="4" name="Curved Down Arrow 3"/>
-          <p:cNvSpPr/>
-          <p:nvPr/>
-        </p:nvSpPr>
-        <p:spPr>
-          <a:xfrm>
-            <a:off x="4133542" y="2266367"/>
-            <a:ext cx="2457100" cy="560982"/>
-          </a:xfrm>
-          <a:prstGeom prst="curvedDownArrow">
-            <a:avLst/>
-          </a:prstGeom>
-          <a:solidFill>
-            <a:srgbClr val="7030A0"/>
-          </a:solidFill>
-          <a:ln>
-            <a:solidFill>
-              <a:schemeClr val="tx1"/>
-            </a:solidFill>
-          </a:ln>
-        </p:spPr>
-        <p:style>
-          <a:lnRef idx="2">
-            <a:schemeClr val="accent1">
-              <a:shade val="50000"/>
-            </a:schemeClr>
-          </a:lnRef>
-          <a:fillRef idx="1">
-            <a:schemeClr val="accent1"/>
-          </a:fillRef>
-          <a:effectRef idx="0">
-            <a:schemeClr val="accent1"/>
-          </a:effectRef>
-          <a:fontRef idx="minor">
-            <a:schemeClr val="lt1"/>
-          </a:fontRef>
-        </p:style>
-        <p:txBody>
-          <a:bodyPr rtlCol="0" anchor="ctr"/>
-          <a:lstStyle/>
-          <a:p>
-            <a:pPr algn="ctr"/>
-            <a:endParaRPr lang="en-US">
-              <a:solidFill>
-                <a:schemeClr val="tx1"/>
-              </a:solidFill>
-            </a:endParaRPr>
-          </a:p>
-        </p:txBody>
-      </p:sp>
-      <p:sp>
-        <p:nvSpPr>
-          <p:cNvPr id="5" name="TextBox 4"/>
-          <p:cNvSpPr txBox="1"/>
-          <p:nvPr/>
-        </p:nvSpPr>
-        <p:spPr>
-          <a:xfrm>
-            <a:off x="3395980" y="3184716"/>
-            <a:ext cx="5432000" cy="461665"/>
-          </a:xfrm>
-          <a:prstGeom prst="rect">
-            <a:avLst/>
-          </a:prstGeom>
-          <a:noFill/>
-        </p:spPr>
-        <p:txBody>
-          <a:bodyPr wrap="none" rtlCol="0">
-            <a:spAutoFit/>
-          </a:bodyPr>
-          <a:lstStyle/>
-          <a:p>
-            <a:r>
-              <a:rPr lang="en-US" sz="2400" dirty="0">
-                <a:latin typeface="+mj-lt"/>
-              </a:rPr>
-              <a:t>Load data </a:t>
-            </a:r>
-            <a:r>
-              <a:rPr lang="en-US" sz="2400" dirty="0">
-                <a:latin typeface="+mj-lt"/>
-                <a:sym typeface="Wingdings" panose="05000000000000000000" pitchFamily="2" charset="2"/>
-              </a:rPr>
-              <a:t> </a:t>
-            </a:r>
-            <a:r>
-              <a:rPr lang="en-US" sz="2400" dirty="0">
-                <a:latin typeface="+mj-lt"/>
-              </a:rPr>
-              <a:t>then </a:t>
-            </a:r>
-            <a:r>
-              <a:rPr lang="en-US" sz="2400" dirty="0">
-                <a:latin typeface="+mj-lt"/>
-                <a:sym typeface="Wingdings" panose="05000000000000000000" pitchFamily="2" charset="2"/>
-              </a:rPr>
-              <a:t> </a:t>
-            </a:r>
-            <a:r>
-              <a:rPr lang="en-US" sz="2400" dirty="0">
-                <a:latin typeface="+mj-lt"/>
-              </a:rPr>
-              <a:t>arrange it by variable</a:t>
-            </a:r>
-          </a:p>
-        </p:txBody>
-      </p:sp>
     </p:spTree>
     <p:extLst>
       <p:ext uri="{BB962C8B-B14F-4D97-AF65-F5344CB8AC3E}">
-        <p14:creationId xmlns:p14="http://schemas.microsoft.com/office/powerpoint/2010/main" val="2080212254"/>
+        <p14:creationId xmlns:p14="http://schemas.microsoft.com/office/powerpoint/2010/main" val="1832471232"/>
       </p:ext>
     </p:extLst>
   </p:cSld>
@@ -11091,79 +10772,8 @@
         </p:nvSpPr>
         <p:spPr>
           <a:xfrm>
-            <a:off x="77463" y="2193439"/>
-            <a:ext cx="5722917" cy="1761481"/>
-          </a:xfrm>
-          <a:prstGeom prst="roundRect">
-            <a:avLst/>
-          </a:prstGeom>
-          <a:solidFill>
-            <a:schemeClr val="accent1">
-              <a:lumMod val="20000"/>
-              <a:lumOff val="80000"/>
-            </a:schemeClr>
-          </a:solidFill>
-        </p:spPr>
-        <p:style>
-          <a:lnRef idx="1">
-            <a:schemeClr val="accent1"/>
-          </a:lnRef>
-          <a:fillRef idx="2">
-            <a:schemeClr val="accent1"/>
-          </a:fillRef>
-          <a:effectRef idx="1">
-            <a:schemeClr val="accent1"/>
-          </a:effectRef>
-          <a:fontRef idx="minor">
-            <a:schemeClr val="dk1"/>
-          </a:fontRef>
-        </p:style>
-        <p:txBody>
-          <a:bodyPr rtlCol="0" anchor="t"/>
-          <a:lstStyle/>
-          <a:p>
-            <a:r>
-              <a:rPr lang="en-US" sz="4400" b="1" dirty="0"/>
-              <a:t>SAS</a:t>
-            </a:r>
-          </a:p>
-          <a:p>
-            <a:r>
-              <a:rPr lang="en-US" sz="2400" dirty="0" err="1">
-                <a:latin typeface="Courier New" panose="02070309020205020404" pitchFamily="49" charset="0"/>
-                <a:cs typeface="Courier New" panose="02070309020205020404" pitchFamily="49" charset="0"/>
-              </a:rPr>
-              <a:t>proc</a:t>
-            </a:r>
-            <a:r>
-              <a:rPr lang="en-US" sz="2400" dirty="0">
-                <a:latin typeface="Courier New" panose="02070309020205020404" pitchFamily="49" charset="0"/>
-                <a:cs typeface="Courier New" panose="02070309020205020404" pitchFamily="49" charset="0"/>
-              </a:rPr>
-              <a:t> contents data=abalone;</a:t>
-            </a:r>
-          </a:p>
-          <a:p>
-            <a:r>
-              <a:rPr lang="en-US" sz="2400" dirty="0">
-                <a:latin typeface="Courier New" panose="02070309020205020404" pitchFamily="49" charset="0"/>
-                <a:cs typeface="Courier New" panose="02070309020205020404" pitchFamily="49" charset="0"/>
-              </a:rPr>
-              <a:t>run;</a:t>
-            </a:r>
-          </a:p>
-        </p:txBody>
-      </p:sp>
-      <p:sp>
-        <p:nvSpPr>
-          <p:cNvPr id="3" name="Rounded Rectangle 2"/>
-          <p:cNvSpPr/>
-          <p:nvPr/>
-        </p:nvSpPr>
-        <p:spPr>
-          <a:xfrm>
-            <a:off x="6391621" y="2193439"/>
-            <a:ext cx="5722917" cy="1761481"/>
+            <a:off x="3395980" y="903183"/>
+            <a:ext cx="5852160" cy="2926080"/>
           </a:xfrm>
           <a:prstGeom prst="roundRect">
             <a:avLst/>
@@ -11200,16 +10810,6 @@
           </a:p>
           <a:p>
             <a:r>
-              <a:rPr lang="en-US" sz="2400" dirty="0" err="1">
-                <a:solidFill>
-                  <a:srgbClr val="0070C0"/>
-                </a:solidFill>
-                <a:latin typeface="Courier New" panose="02070309020205020404" pitchFamily="49" charset="0"/>
-                <a:cs typeface="Courier New" panose="02070309020205020404" pitchFamily="49" charset="0"/>
-              </a:rPr>
-              <a:t>str</a:t>
-            </a:r>
-            <a:r>
               <a:rPr lang="en-US" sz="2400" dirty="0">
                 <a:solidFill>
                   <a:srgbClr val="0070C0"/>
@@ -11217,12 +10817,8 @@
                 <a:latin typeface="Courier New" panose="02070309020205020404" pitchFamily="49" charset="0"/>
                 <a:cs typeface="Courier New" panose="02070309020205020404" pitchFamily="49" charset="0"/>
               </a:rPr>
-              <a:t>(abalone)</a:t>
-            </a:r>
-            <a:endParaRPr lang="en-US" sz="2400" dirty="0">
-              <a:latin typeface="Courier New" panose="02070309020205020404" pitchFamily="49" charset="0"/>
-              <a:cs typeface="Courier New" panose="02070309020205020404" pitchFamily="49" charset="0"/>
-            </a:endParaRPr>
+              <a:t>arrange(abalone, diameter)</a:t>
+            </a:r>
           </a:p>
           <a:p>
             <a:endParaRPr lang="en-US" sz="2400" dirty="0">
@@ -11233,57 +10829,39 @@
               <a:cs typeface="Courier New" panose="02070309020205020404" pitchFamily="49" charset="0"/>
             </a:endParaRPr>
           </a:p>
-        </p:txBody>
-      </p:sp>
-      <p:cxnSp>
-        <p:nvCxnSpPr>
-          <p:cNvPr id="12" name="Straight Arrow Connector 11"/>
-          <p:cNvCxnSpPr>
-            <a:stCxn id="2" idx="3"/>
-            <a:endCxn id="3" idx="1"/>
-          </p:cNvCxnSpPr>
-          <p:nvPr/>
-        </p:nvCxnSpPr>
-        <p:spPr>
-          <a:xfrm>
-            <a:off x="5800380" y="3074180"/>
-            <a:ext cx="591241" cy="0"/>
-          </a:xfrm>
-          <a:prstGeom prst="straightConnector1">
-            <a:avLst/>
-          </a:prstGeom>
-          <a:ln w="76200">
-            <a:solidFill>
-              <a:srgbClr val="7030A0"/>
-            </a:solidFill>
-            <a:tailEnd type="triangle"/>
-          </a:ln>
-        </p:spPr>
-        <p:style>
-          <a:lnRef idx="1">
-            <a:schemeClr val="accent1"/>
-          </a:lnRef>
-          <a:fillRef idx="0">
-            <a:schemeClr val="accent1"/>
-          </a:fillRef>
-          <a:effectRef idx="0">
-            <a:schemeClr val="accent1"/>
-          </a:effectRef>
-          <a:fontRef idx="minor">
-            <a:schemeClr val="tx1"/>
-          </a:fontRef>
-        </p:style>
-      </p:cxnSp>
-      <p:sp>
-        <p:nvSpPr>
-          <p:cNvPr id="6" name="Rounded Rectangle 5"/>
+          <a:p>
+            <a:endParaRPr lang="en-US" sz="2400" dirty="0">
+              <a:solidFill>
+                <a:srgbClr val="0070C0"/>
+              </a:solidFill>
+              <a:latin typeface="Courier New" panose="02070309020205020404" pitchFamily="49" charset="0"/>
+              <a:cs typeface="Courier New" panose="02070309020205020404" pitchFamily="49" charset="0"/>
+            </a:endParaRPr>
+          </a:p>
+          <a:p>
+            <a:r>
+              <a:rPr lang="en-US" sz="2400" dirty="0">
+                <a:solidFill>
+                  <a:srgbClr val="0070C0"/>
+                </a:solidFill>
+                <a:latin typeface="Courier New" panose="02070309020205020404" pitchFamily="49" charset="0"/>
+                <a:cs typeface="Courier New" panose="02070309020205020404" pitchFamily="49" charset="0"/>
+              </a:rPr>
+              <a:t>abalone %&gt;% arrange(diameter)</a:t>
+            </a:r>
+          </a:p>
+        </p:txBody>
+      </p:sp>
+      <p:sp>
+        <p:nvSpPr>
+          <p:cNvPr id="3" name="Rounded Rectangle 2"/>
           <p:cNvSpPr/>
           <p:nvPr/>
         </p:nvSpPr>
         <p:spPr>
           <a:xfrm>
-            <a:off x="2760029" y="2961983"/>
-            <a:ext cx="2260756" cy="426346"/>
+            <a:off x="5060054" y="1705385"/>
+            <a:ext cx="1301477" cy="426346"/>
           </a:xfrm>
           <a:prstGeom prst="roundRect">
             <a:avLst/>
@@ -11326,14 +10904,14 @@
       </p:sp>
       <p:sp>
         <p:nvSpPr>
-          <p:cNvPr id="7" name="Rounded Rectangle 6"/>
+          <p:cNvPr id="4" name="Rounded Rectangle 3"/>
           <p:cNvSpPr/>
           <p:nvPr/>
         </p:nvSpPr>
         <p:spPr>
           <a:xfrm>
-            <a:off x="7271259" y="2961983"/>
-            <a:ext cx="1311761" cy="426346"/>
+            <a:off x="3608046" y="2822673"/>
+            <a:ext cx="1301477" cy="426346"/>
           </a:xfrm>
           <a:prstGeom prst="roundRect">
             <a:avLst/>
@@ -11374,10 +10952,49 @@
           </a:p>
         </p:txBody>
       </p:sp>
+      <p:cxnSp>
+        <p:nvCxnSpPr>
+          <p:cNvPr id="6" name="Straight Arrow Connector 5"/>
+          <p:cNvCxnSpPr>
+            <a:stCxn id="3" idx="2"/>
+            <a:endCxn id="4" idx="0"/>
+          </p:cNvCxnSpPr>
+          <p:nvPr/>
+        </p:nvCxnSpPr>
+        <p:spPr>
+          <a:xfrm flipH="1">
+            <a:off x="4258785" y="2131731"/>
+            <a:ext cx="1452008" cy="690942"/>
+          </a:xfrm>
+          <a:prstGeom prst="straightConnector1">
+            <a:avLst/>
+          </a:prstGeom>
+          <a:ln w="57150">
+            <a:solidFill>
+              <a:schemeClr val="tx1"/>
+            </a:solidFill>
+            <a:tailEnd type="triangle"/>
+          </a:ln>
+        </p:spPr>
+        <p:style>
+          <a:lnRef idx="1">
+            <a:schemeClr val="accent1"/>
+          </a:lnRef>
+          <a:fillRef idx="0">
+            <a:schemeClr val="accent1"/>
+          </a:fillRef>
+          <a:effectRef idx="0">
+            <a:schemeClr val="accent1"/>
+          </a:effectRef>
+          <a:fontRef idx="minor">
+            <a:schemeClr val="tx1"/>
+          </a:fontRef>
+        </p:style>
+      </p:cxnSp>
     </p:spTree>
     <p:extLst>
       <p:ext uri="{BB962C8B-B14F-4D97-AF65-F5344CB8AC3E}">
-        <p14:creationId xmlns:p14="http://schemas.microsoft.com/office/powerpoint/2010/main" val="762780022"/>
+        <p14:creationId xmlns:p14="http://schemas.microsoft.com/office/powerpoint/2010/main" val="1963359858"/>
       </p:ext>
     </p:extLst>
   </p:cSld>
@@ -11388,6 +11005,451 @@
 </file>
 
 <file path=ppt/slides/slide27.xml><?xml version="1.0" encoding="utf-8"?>
+<p:sld xmlns:a="http://schemas.openxmlformats.org/drawingml/2006/main" xmlns:r="http://schemas.openxmlformats.org/officeDocument/2006/relationships" xmlns:p="http://schemas.openxmlformats.org/presentationml/2006/main">
+  <p:cSld>
+    <p:spTree>
+      <p:nvGrpSpPr>
+        <p:cNvPr id="1" name=""/>
+        <p:cNvGrpSpPr/>
+        <p:nvPr/>
+      </p:nvGrpSpPr>
+      <p:grpSpPr>
+        <a:xfrm>
+          <a:off x="0" y="0"/>
+          <a:ext cx="0" cy="0"/>
+          <a:chOff x="0" y="0"/>
+          <a:chExt cx="0" cy="0"/>
+        </a:xfrm>
+      </p:grpSpPr>
+      <p:sp>
+        <p:nvSpPr>
+          <p:cNvPr id="2" name="Rounded Rectangle 1"/>
+          <p:cNvSpPr/>
+          <p:nvPr/>
+        </p:nvSpPr>
+        <p:spPr>
+          <a:xfrm>
+            <a:off x="3395980" y="903183"/>
+            <a:ext cx="5852160" cy="2926080"/>
+          </a:xfrm>
+          <a:prstGeom prst="roundRect">
+            <a:avLst/>
+          </a:prstGeom>
+          <a:solidFill>
+            <a:schemeClr val="accent4">
+              <a:lumMod val="20000"/>
+              <a:lumOff val="80000"/>
+            </a:schemeClr>
+          </a:solidFill>
+        </p:spPr>
+        <p:style>
+          <a:lnRef idx="1">
+            <a:schemeClr val="accent4"/>
+          </a:lnRef>
+          <a:fillRef idx="2">
+            <a:schemeClr val="accent4"/>
+          </a:fillRef>
+          <a:effectRef idx="1">
+            <a:schemeClr val="accent4"/>
+          </a:effectRef>
+          <a:fontRef idx="minor">
+            <a:schemeClr val="dk1"/>
+          </a:fontRef>
+        </p:style>
+        <p:txBody>
+          <a:bodyPr rtlCol="0" anchor="t"/>
+          <a:lstStyle/>
+          <a:p>
+            <a:r>
+              <a:rPr lang="en-US" sz="4400" b="1" dirty="0"/>
+              <a:t>R</a:t>
+            </a:r>
+          </a:p>
+          <a:p>
+            <a:r>
+              <a:rPr lang="en-US" sz="2400" dirty="0">
+                <a:solidFill>
+                  <a:srgbClr val="0070C0"/>
+                </a:solidFill>
+                <a:latin typeface="Courier New" panose="02070309020205020404" pitchFamily="49" charset="0"/>
+                <a:cs typeface="Courier New" panose="02070309020205020404" pitchFamily="49" charset="0"/>
+              </a:rPr>
+              <a:t>arrange(abalone, diameter)</a:t>
+            </a:r>
+          </a:p>
+          <a:p>
+            <a:endParaRPr lang="en-US" sz="2400" dirty="0">
+              <a:solidFill>
+                <a:srgbClr val="0070C0"/>
+              </a:solidFill>
+              <a:latin typeface="Courier New" panose="02070309020205020404" pitchFamily="49" charset="0"/>
+              <a:cs typeface="Courier New" panose="02070309020205020404" pitchFamily="49" charset="0"/>
+            </a:endParaRPr>
+          </a:p>
+          <a:p>
+            <a:endParaRPr lang="en-US" sz="2400" dirty="0">
+              <a:solidFill>
+                <a:srgbClr val="0070C0"/>
+              </a:solidFill>
+              <a:latin typeface="Courier New" panose="02070309020205020404" pitchFamily="49" charset="0"/>
+              <a:cs typeface="Courier New" panose="02070309020205020404" pitchFamily="49" charset="0"/>
+            </a:endParaRPr>
+          </a:p>
+          <a:p>
+            <a:r>
+              <a:rPr lang="en-US" sz="2400" dirty="0">
+                <a:solidFill>
+                  <a:srgbClr val="0070C0"/>
+                </a:solidFill>
+                <a:latin typeface="Courier New" panose="02070309020205020404" pitchFamily="49" charset="0"/>
+                <a:cs typeface="Courier New" panose="02070309020205020404" pitchFamily="49" charset="0"/>
+              </a:rPr>
+              <a:t>abalone %&gt;% arrange(diameter)</a:t>
+            </a:r>
+          </a:p>
+        </p:txBody>
+      </p:sp>
+      <p:sp>
+        <p:nvSpPr>
+          <p:cNvPr id="7" name="Rounded Rectangle 6"/>
+          <p:cNvSpPr/>
+          <p:nvPr/>
+        </p:nvSpPr>
+        <p:spPr>
+          <a:xfrm>
+            <a:off x="4990953" y="2827348"/>
+            <a:ext cx="742279" cy="426346"/>
+          </a:xfrm>
+          <a:prstGeom prst="roundRect">
+            <a:avLst/>
+          </a:prstGeom>
+          <a:solidFill>
+            <a:srgbClr val="7030A0">
+              <a:alpha val="30196"/>
+            </a:srgbClr>
+          </a:solidFill>
+          <a:ln>
+            <a:solidFill>
+              <a:srgbClr val="00B050"/>
+            </a:solidFill>
+          </a:ln>
+        </p:spPr>
+        <p:style>
+          <a:lnRef idx="2">
+            <a:schemeClr val="accent1">
+              <a:shade val="50000"/>
+            </a:schemeClr>
+          </a:lnRef>
+          <a:fillRef idx="1">
+            <a:schemeClr val="accent1"/>
+          </a:fillRef>
+          <a:effectRef idx="0">
+            <a:schemeClr val="accent1"/>
+          </a:effectRef>
+          <a:fontRef idx="minor">
+            <a:schemeClr val="lt1"/>
+          </a:fontRef>
+        </p:style>
+        <p:txBody>
+          <a:bodyPr rtlCol="0" anchor="ctr"/>
+          <a:lstStyle/>
+          <a:p>
+            <a:pPr algn="ctr"/>
+            <a:endParaRPr lang="en-US"/>
+          </a:p>
+        </p:txBody>
+      </p:sp>
+    </p:spTree>
+    <p:extLst>
+      <p:ext uri="{BB962C8B-B14F-4D97-AF65-F5344CB8AC3E}">
+        <p14:creationId xmlns:p14="http://schemas.microsoft.com/office/powerpoint/2010/main" val="2666733228"/>
+      </p:ext>
+    </p:extLst>
+  </p:cSld>
+  <p:clrMapOvr>
+    <a:masterClrMapping/>
+  </p:clrMapOvr>
+</p:sld>
+</file>
+
+<file path=ppt/slides/slide28.xml><?xml version="1.0" encoding="utf-8"?>
+<p:sld xmlns:a="http://schemas.openxmlformats.org/drawingml/2006/main" xmlns:r="http://schemas.openxmlformats.org/officeDocument/2006/relationships" xmlns:p="http://schemas.openxmlformats.org/presentationml/2006/main">
+  <p:cSld>
+    <p:spTree>
+      <p:nvGrpSpPr>
+        <p:cNvPr id="1" name=""/>
+        <p:cNvGrpSpPr/>
+        <p:nvPr/>
+      </p:nvGrpSpPr>
+      <p:grpSpPr>
+        <a:xfrm>
+          <a:off x="0" y="0"/>
+          <a:ext cx="0" cy="0"/>
+          <a:chOff x="0" y="0"/>
+          <a:chExt cx="0" cy="0"/>
+        </a:xfrm>
+      </p:grpSpPr>
+      <p:sp>
+        <p:nvSpPr>
+          <p:cNvPr id="2" name="Rounded Rectangle 1"/>
+          <p:cNvSpPr/>
+          <p:nvPr/>
+        </p:nvSpPr>
+        <p:spPr>
+          <a:xfrm>
+            <a:off x="3395980" y="903183"/>
+            <a:ext cx="5852160" cy="2926080"/>
+          </a:xfrm>
+          <a:prstGeom prst="roundRect">
+            <a:avLst/>
+          </a:prstGeom>
+          <a:solidFill>
+            <a:schemeClr val="accent4">
+              <a:lumMod val="20000"/>
+              <a:lumOff val="80000"/>
+            </a:schemeClr>
+          </a:solidFill>
+        </p:spPr>
+        <p:style>
+          <a:lnRef idx="1">
+            <a:schemeClr val="accent4"/>
+          </a:lnRef>
+          <a:fillRef idx="2">
+            <a:schemeClr val="accent4"/>
+          </a:fillRef>
+          <a:effectRef idx="1">
+            <a:schemeClr val="accent4"/>
+          </a:effectRef>
+          <a:fontRef idx="minor">
+            <a:schemeClr val="dk1"/>
+          </a:fontRef>
+        </p:style>
+        <p:txBody>
+          <a:bodyPr rtlCol="0" anchor="t"/>
+          <a:lstStyle/>
+          <a:p>
+            <a:r>
+              <a:rPr lang="en-US" sz="4400" b="1" dirty="0"/>
+              <a:t>R</a:t>
+            </a:r>
+          </a:p>
+          <a:p>
+            <a:r>
+              <a:rPr lang="en-US" sz="2400" dirty="0">
+                <a:solidFill>
+                  <a:srgbClr val="0070C0"/>
+                </a:solidFill>
+                <a:latin typeface="Courier New" panose="02070309020205020404" pitchFamily="49" charset="0"/>
+                <a:cs typeface="Courier New" panose="02070309020205020404" pitchFamily="49" charset="0"/>
+              </a:rPr>
+              <a:t>arrange(abalone, diameter)</a:t>
+            </a:r>
+          </a:p>
+          <a:p>
+            <a:endParaRPr lang="en-US" sz="2400" dirty="0">
+              <a:solidFill>
+                <a:srgbClr val="0070C0"/>
+              </a:solidFill>
+              <a:latin typeface="Courier New" panose="02070309020205020404" pitchFamily="49" charset="0"/>
+              <a:cs typeface="Courier New" panose="02070309020205020404" pitchFamily="49" charset="0"/>
+            </a:endParaRPr>
+          </a:p>
+          <a:p>
+            <a:endParaRPr lang="en-US" sz="2400" dirty="0">
+              <a:solidFill>
+                <a:srgbClr val="0070C0"/>
+              </a:solidFill>
+              <a:latin typeface="Courier New" panose="02070309020205020404" pitchFamily="49" charset="0"/>
+              <a:cs typeface="Courier New" panose="02070309020205020404" pitchFamily="49" charset="0"/>
+            </a:endParaRPr>
+          </a:p>
+          <a:p>
+            <a:r>
+              <a:rPr lang="en-US" sz="2400" dirty="0">
+                <a:solidFill>
+                  <a:srgbClr val="0070C0"/>
+                </a:solidFill>
+                <a:latin typeface="Courier New" panose="02070309020205020404" pitchFamily="49" charset="0"/>
+                <a:cs typeface="Courier New" panose="02070309020205020404" pitchFamily="49" charset="0"/>
+              </a:rPr>
+              <a:t>abalone %&gt;% arrange(diameter)</a:t>
+            </a:r>
+          </a:p>
+        </p:txBody>
+      </p:sp>
+      <p:sp>
+        <p:nvSpPr>
+          <p:cNvPr id="7" name="Rounded Rectangle 6"/>
+          <p:cNvSpPr/>
+          <p:nvPr/>
+        </p:nvSpPr>
+        <p:spPr>
+          <a:xfrm>
+            <a:off x="4990953" y="2827348"/>
+            <a:ext cx="742279" cy="426346"/>
+          </a:xfrm>
+          <a:prstGeom prst="roundRect">
+            <a:avLst/>
+          </a:prstGeom>
+          <a:solidFill>
+            <a:srgbClr val="7030A0">
+              <a:alpha val="30196"/>
+            </a:srgbClr>
+          </a:solidFill>
+          <a:ln>
+            <a:solidFill>
+              <a:srgbClr val="00B050"/>
+            </a:solidFill>
+          </a:ln>
+        </p:spPr>
+        <p:style>
+          <a:lnRef idx="2">
+            <a:schemeClr val="accent1">
+              <a:shade val="50000"/>
+            </a:schemeClr>
+          </a:lnRef>
+          <a:fillRef idx="1">
+            <a:schemeClr val="accent1"/>
+          </a:fillRef>
+          <a:effectRef idx="0">
+            <a:schemeClr val="accent1"/>
+          </a:effectRef>
+          <a:fontRef idx="minor">
+            <a:schemeClr val="lt1"/>
+          </a:fontRef>
+        </p:style>
+        <p:txBody>
+          <a:bodyPr rtlCol="0" anchor="ctr"/>
+          <a:lstStyle/>
+          <a:p>
+            <a:pPr algn="ctr"/>
+            <a:endParaRPr lang="en-US"/>
+          </a:p>
+        </p:txBody>
+      </p:sp>
+      <p:sp>
+        <p:nvSpPr>
+          <p:cNvPr id="4" name="Curved Down Arrow 3"/>
+          <p:cNvSpPr/>
+          <p:nvPr/>
+        </p:nvSpPr>
+        <p:spPr>
+          <a:xfrm>
+            <a:off x="4133542" y="2266367"/>
+            <a:ext cx="2457100" cy="560982"/>
+          </a:xfrm>
+          <a:prstGeom prst="curvedDownArrow">
+            <a:avLst/>
+          </a:prstGeom>
+          <a:solidFill>
+            <a:srgbClr val="7030A0"/>
+          </a:solidFill>
+          <a:ln>
+            <a:solidFill>
+              <a:schemeClr val="tx1"/>
+            </a:solidFill>
+          </a:ln>
+        </p:spPr>
+        <p:style>
+          <a:lnRef idx="2">
+            <a:schemeClr val="accent1">
+              <a:shade val="50000"/>
+            </a:schemeClr>
+          </a:lnRef>
+          <a:fillRef idx="1">
+            <a:schemeClr val="accent1"/>
+          </a:fillRef>
+          <a:effectRef idx="0">
+            <a:schemeClr val="accent1"/>
+          </a:effectRef>
+          <a:fontRef idx="minor">
+            <a:schemeClr val="lt1"/>
+          </a:fontRef>
+        </p:style>
+        <p:txBody>
+          <a:bodyPr rtlCol="0" anchor="ctr"/>
+          <a:lstStyle/>
+          <a:p>
+            <a:pPr algn="ctr"/>
+            <a:endParaRPr lang="en-US">
+              <a:solidFill>
+                <a:schemeClr val="tx1"/>
+              </a:solidFill>
+            </a:endParaRPr>
+          </a:p>
+        </p:txBody>
+      </p:sp>
+      <p:sp>
+        <p:nvSpPr>
+          <p:cNvPr id="5" name="TextBox 4"/>
+          <p:cNvSpPr txBox="1"/>
+          <p:nvPr/>
+        </p:nvSpPr>
+        <p:spPr>
+          <a:xfrm>
+            <a:off x="3395980" y="3184716"/>
+            <a:ext cx="5432000" cy="461665"/>
+          </a:xfrm>
+          <a:prstGeom prst="rect">
+            <a:avLst/>
+          </a:prstGeom>
+          <a:noFill/>
+        </p:spPr>
+        <p:txBody>
+          <a:bodyPr wrap="none" rtlCol="0">
+            <a:spAutoFit/>
+          </a:bodyPr>
+          <a:lstStyle/>
+          <a:p>
+            <a:r>
+              <a:rPr lang="en-US" sz="2400" dirty="0">
+                <a:latin typeface="+mj-lt"/>
+              </a:rPr>
+              <a:t>Load data </a:t>
+            </a:r>
+            <a:r>
+              <a:rPr lang="en-US" sz="2400" dirty="0">
+                <a:latin typeface="+mj-lt"/>
+                <a:sym typeface="Wingdings" panose="05000000000000000000" pitchFamily="2" charset="2"/>
+              </a:rPr>
+              <a:t> </a:t>
+            </a:r>
+            <a:r>
+              <a:rPr lang="en-US" sz="2400" dirty="0">
+                <a:latin typeface="+mj-lt"/>
+              </a:rPr>
+              <a:t>then </a:t>
+            </a:r>
+            <a:r>
+              <a:rPr lang="en-US" sz="2400" dirty="0">
+                <a:latin typeface="+mj-lt"/>
+                <a:sym typeface="Wingdings" panose="05000000000000000000" pitchFamily="2" charset="2"/>
+              </a:rPr>
+              <a:t> </a:t>
+            </a:r>
+            <a:r>
+              <a:rPr lang="en-US" sz="2400" dirty="0">
+                <a:latin typeface="+mj-lt"/>
+              </a:rPr>
+              <a:t>arrange it by variable</a:t>
+            </a:r>
+          </a:p>
+        </p:txBody>
+      </p:sp>
+    </p:spTree>
+    <p:extLst>
+      <p:ext uri="{BB962C8B-B14F-4D97-AF65-F5344CB8AC3E}">
+        <p14:creationId xmlns:p14="http://schemas.microsoft.com/office/powerpoint/2010/main" val="2080212254"/>
+      </p:ext>
+    </p:extLst>
+  </p:cSld>
+  <p:clrMapOvr>
+    <a:masterClrMapping/>
+  </p:clrMapOvr>
+</p:sld>
+</file>
+
+<file path=ppt/slides/slide29.xml><?xml version="1.0" encoding="utf-8"?>
 <p:sld xmlns:a="http://schemas.openxmlformats.org/drawingml/2006/main" xmlns:r="http://schemas.openxmlformats.org/officeDocument/2006/relationships" xmlns:p="http://schemas.openxmlformats.org/presentationml/2006/main" show="0">
   <p:cSld>
     <p:spTree>
@@ -11467,7 +11529,104 @@
 </p:sld>
 </file>
 
-<file path=ppt/slides/slide28.xml><?xml version="1.0" encoding="utf-8"?>
+<file path=ppt/slides/slide3.xml><?xml version="1.0" encoding="utf-8"?>
+<p:sld xmlns:a="http://schemas.openxmlformats.org/drawingml/2006/main" xmlns:r="http://schemas.openxmlformats.org/officeDocument/2006/relationships" xmlns:p="http://schemas.openxmlformats.org/presentationml/2006/main">
+  <p:cSld>
+    <p:spTree>
+      <p:nvGrpSpPr>
+        <p:cNvPr id="1" name=""/>
+        <p:cNvGrpSpPr/>
+        <p:nvPr/>
+      </p:nvGrpSpPr>
+      <p:grpSpPr>
+        <a:xfrm>
+          <a:off x="0" y="0"/>
+          <a:ext cx="0" cy="0"/>
+          <a:chOff x="0" y="0"/>
+          <a:chExt cx="0" cy="0"/>
+        </a:xfrm>
+      </p:grpSpPr>
+      <p:sp>
+        <p:nvSpPr>
+          <p:cNvPr id="2" name="Title 1">
+            <a:extLst>
+              <a:ext uri="{FF2B5EF4-FFF2-40B4-BE49-F238E27FC236}">
+                <a16:creationId xmlns:a16="http://schemas.microsoft.com/office/drawing/2014/main" id="{CA96845E-C19E-4873-9A48-C5EE8CD33B60}"/>
+              </a:ext>
+            </a:extLst>
+          </p:cNvPr>
+          <p:cNvSpPr>
+            <a:spLocks noGrp="1"/>
+          </p:cNvSpPr>
+          <p:nvPr>
+            <p:ph type="title"/>
+          </p:nvPr>
+        </p:nvSpPr>
+        <p:spPr/>
+        <p:txBody>
+          <a:bodyPr/>
+          <a:lstStyle/>
+          <a:p>
+            <a:r>
+              <a:rPr lang="en-US" dirty="0" err="1"/>
+              <a:t>Rstudio.cloud</a:t>
+            </a:r>
+            <a:endParaRPr lang="en-US" dirty="0"/>
+          </a:p>
+        </p:txBody>
+      </p:sp>
+      <p:sp>
+        <p:nvSpPr>
+          <p:cNvPr id="3" name="Content Placeholder 2">
+            <a:extLst>
+              <a:ext uri="{FF2B5EF4-FFF2-40B4-BE49-F238E27FC236}">
+                <a16:creationId xmlns:a16="http://schemas.microsoft.com/office/drawing/2014/main" id="{12F72FCD-B4E2-4181-81DF-B34BCEAE9102}"/>
+              </a:ext>
+            </a:extLst>
+          </p:cNvPr>
+          <p:cNvSpPr>
+            <a:spLocks noGrp="1"/>
+          </p:cNvSpPr>
+          <p:nvPr>
+            <p:ph idx="1"/>
+          </p:nvPr>
+        </p:nvSpPr>
+        <p:spPr/>
+        <p:txBody>
+          <a:bodyPr/>
+          <a:lstStyle/>
+          <a:p>
+            <a:r>
+              <a:rPr lang="en-US" dirty="0"/>
+              <a:t>Go to </a:t>
+            </a:r>
+            <a:r>
+              <a:rPr lang="en-US" dirty="0">
+                <a:hlinkClick r:id="rId2"/>
+              </a:rPr>
+              <a:t>https://rstudio.cloud/spaces/36397/join?access_code=sVkAKq5o45zIeUMI2EhDJps3PgY5NF28X5UELrOf</a:t>
+            </a:r>
+            <a:endParaRPr lang="en-US" dirty="0"/>
+          </a:p>
+          <a:p>
+            <a:endParaRPr lang="en-US" dirty="0"/>
+          </a:p>
+        </p:txBody>
+      </p:sp>
+    </p:spTree>
+    <p:extLst>
+      <p:ext uri="{BB962C8B-B14F-4D97-AF65-F5344CB8AC3E}">
+        <p14:creationId xmlns:p14="http://schemas.microsoft.com/office/powerpoint/2010/main" val="2908228497"/>
+      </p:ext>
+    </p:extLst>
+  </p:cSld>
+  <p:clrMapOvr>
+    <a:masterClrMapping/>
+  </p:clrMapOvr>
+</p:sld>
+</file>
+
+<file path=ppt/slides/slide30.xml><?xml version="1.0" encoding="utf-8"?>
 <p:sld xmlns:a="http://schemas.openxmlformats.org/drawingml/2006/main" xmlns:r="http://schemas.openxmlformats.org/officeDocument/2006/relationships" xmlns:p="http://schemas.openxmlformats.org/presentationml/2006/main" show="0">
   <p:cSld>
     <p:spTree>
@@ -12513,7 +12672,7 @@
 </p:sld>
 </file>
 
-<file path=ppt/slides/slide29.xml><?xml version="1.0" encoding="utf-8"?>
+<file path=ppt/slides/slide31.xml><?xml version="1.0" encoding="utf-8"?>
 <p:sld xmlns:a="http://schemas.openxmlformats.org/drawingml/2006/main" xmlns:r="http://schemas.openxmlformats.org/officeDocument/2006/relationships" xmlns:p="http://schemas.openxmlformats.org/presentationml/2006/main" show="0">
   <p:cSld>
     <p:spTree>
@@ -13692,104 +13851,7 @@
 </p:sld>
 </file>
 
-<file path=ppt/slides/slide3.xml><?xml version="1.0" encoding="utf-8"?>
-<p:sld xmlns:a="http://schemas.openxmlformats.org/drawingml/2006/main" xmlns:r="http://schemas.openxmlformats.org/officeDocument/2006/relationships" xmlns:p="http://schemas.openxmlformats.org/presentationml/2006/main">
-  <p:cSld>
-    <p:spTree>
-      <p:nvGrpSpPr>
-        <p:cNvPr id="1" name=""/>
-        <p:cNvGrpSpPr/>
-        <p:nvPr/>
-      </p:nvGrpSpPr>
-      <p:grpSpPr>
-        <a:xfrm>
-          <a:off x="0" y="0"/>
-          <a:ext cx="0" cy="0"/>
-          <a:chOff x="0" y="0"/>
-          <a:chExt cx="0" cy="0"/>
-        </a:xfrm>
-      </p:grpSpPr>
-      <p:sp>
-        <p:nvSpPr>
-          <p:cNvPr id="2" name="Title 1">
-            <a:extLst>
-              <a:ext uri="{FF2B5EF4-FFF2-40B4-BE49-F238E27FC236}">
-                <a16:creationId xmlns:a16="http://schemas.microsoft.com/office/drawing/2014/main" id="{CA96845E-C19E-4873-9A48-C5EE8CD33B60}"/>
-              </a:ext>
-            </a:extLst>
-          </p:cNvPr>
-          <p:cNvSpPr>
-            <a:spLocks noGrp="1"/>
-          </p:cNvSpPr>
-          <p:nvPr>
-            <p:ph type="title"/>
-          </p:nvPr>
-        </p:nvSpPr>
-        <p:spPr/>
-        <p:txBody>
-          <a:bodyPr/>
-          <a:lstStyle/>
-          <a:p>
-            <a:r>
-              <a:rPr lang="en-US" dirty="0" err="1"/>
-              <a:t>Rstudio.cloud</a:t>
-            </a:r>
-            <a:endParaRPr lang="en-US" dirty="0"/>
-          </a:p>
-        </p:txBody>
-      </p:sp>
-      <p:sp>
-        <p:nvSpPr>
-          <p:cNvPr id="3" name="Content Placeholder 2">
-            <a:extLst>
-              <a:ext uri="{FF2B5EF4-FFF2-40B4-BE49-F238E27FC236}">
-                <a16:creationId xmlns:a16="http://schemas.microsoft.com/office/drawing/2014/main" id="{12F72FCD-B4E2-4181-81DF-B34BCEAE9102}"/>
-              </a:ext>
-            </a:extLst>
-          </p:cNvPr>
-          <p:cNvSpPr>
-            <a:spLocks noGrp="1"/>
-          </p:cNvSpPr>
-          <p:nvPr>
-            <p:ph idx="1"/>
-          </p:nvPr>
-        </p:nvSpPr>
-        <p:spPr/>
-        <p:txBody>
-          <a:bodyPr/>
-          <a:lstStyle/>
-          <a:p>
-            <a:r>
-              <a:rPr lang="en-US" dirty="0"/>
-              <a:t>Go to </a:t>
-            </a:r>
-            <a:r>
-              <a:rPr lang="en-US" dirty="0">
-                <a:hlinkClick r:id="rId2"/>
-              </a:rPr>
-              <a:t>https://rstudio.cloud/spaces/36397/join?access_code=sVkAKq5o45zIeUMI2EhDJps3PgY5NF28X5UELrOf</a:t>
-            </a:r>
-            <a:endParaRPr lang="en-US" dirty="0"/>
-          </a:p>
-          <a:p>
-            <a:endParaRPr lang="en-US" dirty="0"/>
-          </a:p>
-        </p:txBody>
-      </p:sp>
-    </p:spTree>
-    <p:extLst>
-      <p:ext uri="{BB962C8B-B14F-4D97-AF65-F5344CB8AC3E}">
-        <p14:creationId xmlns:p14="http://schemas.microsoft.com/office/powerpoint/2010/main" val="2908228497"/>
-      </p:ext>
-    </p:extLst>
-  </p:cSld>
-  <p:clrMapOvr>
-    <a:masterClrMapping/>
-  </p:clrMapOvr>
-</p:sld>
-</file>
-
-<file path=ppt/slides/slide30.xml><?xml version="1.0" encoding="utf-8"?>
+<file path=ppt/slides/slide32.xml><?xml version="1.0" encoding="utf-8"?>
 <p:sld xmlns:a="http://schemas.openxmlformats.org/drawingml/2006/main" xmlns:r="http://schemas.openxmlformats.org/officeDocument/2006/relationships" xmlns:p="http://schemas.openxmlformats.org/presentationml/2006/main" show="0">
   <p:cSld>
     <p:spTree>
@@ -14132,7 +14194,7 @@
 </p:sld>
 </file>
 
-<file path=ppt/slides/slide31.xml><?xml version="1.0" encoding="utf-8"?>
+<file path=ppt/slides/slide33.xml><?xml version="1.0" encoding="utf-8"?>
 <p:sld xmlns:a="http://schemas.openxmlformats.org/drawingml/2006/main" xmlns:r="http://schemas.openxmlformats.org/officeDocument/2006/relationships" xmlns:p="http://schemas.openxmlformats.org/presentationml/2006/main" show="0">
   <p:cSld>
     <p:spTree>
@@ -15346,7 +15408,7 @@
 </p:sld>
 </file>
 
-<file path=ppt/slides/slide32.xml><?xml version="1.0" encoding="utf-8"?>
+<file path=ppt/slides/slide34.xml><?xml version="1.0" encoding="utf-8"?>
 <p:sld xmlns:a="http://schemas.openxmlformats.org/drawingml/2006/main" xmlns:r="http://schemas.openxmlformats.org/officeDocument/2006/relationships" xmlns:p="http://schemas.openxmlformats.org/presentationml/2006/main" show="0">
   <p:cSld>
     <p:spTree>

</xml_diff>